<commit_message>
Updated Abstract and Poster with some revisions
</commit_message>
<xml_diff>
--- a/Fellowship Conference 2022/Poster.pptx
+++ b/Fellowship Conference 2022/Poster.pptx
@@ -3601,7 +3601,7 @@
                 <a:ea typeface="Calibri" panose="020F0502020204030204" pitchFamily="34" charset="0"/>
                 <a:cs typeface="Times New Roman" panose="02020603050405020304" pitchFamily="18" charset="0"/>
               </a:rPr>
-              <a:t>alkers differ in how they produce speech sounds, even when they share similar language backgrounds Still, listeners understand newly encountered talkers when hearing them speak for the first time. To overcome speech variation, the brain actively learns how talkers speak, and constructs expectations about that talker will produce speech in the future.  Though this process often occurs without the listener noticing, it still requires cognitive resources. In this experiment, we limit the available resources for speech perception by exposing a listener to two talkers speaking simultaneously. We then test the effects of directing the listener’s attention to one talker on the listener’s ability adapt to both talkers.</a:t>
+              <a:t>alkers differ in how they produce speech sounds, even when they share similar language backgrounds. Still, listeners understand newly encountered talkers when hearing them speak for the first time. To overcome speech variation, the brain actively learns how talkers speak, and constructs expectations about how that talker will produce speech in the future. Though this process often occurs without the listener noticing, it still requires cognitive resources. In this experiment, we will limit the available resources for speech perception by exposing a listener to two talkers speaking simultaneously. We will then test the effects of directing the listener’s attention to one talker on the listener’s ability adapt to both talkers.</a:t>
             </a:r>
           </a:p>
         </p:txBody>
@@ -3749,7 +3749,7 @@
                 </a:solidFill>
                 <a:latin typeface="Amasis MT Pro" panose="02040504050005020304" pitchFamily="18" charset="0"/>
               </a:rPr>
-              <a:t>This quality Could allow us to simulate two distinct talkers with different S-ʃ productions during the same experimental exposure </a:t>
+              <a:t>This quality could allow us to simulate two distinct talkers with different S-ʃ productions during the same experimental exposure </a:t>
             </a:r>
             <a:r>
               <a:rPr lang="en-US" sz="3600" dirty="0">
@@ -3834,7 +3834,7 @@
                 </a:solidFill>
                 <a:latin typeface="Amasis MT Pro" panose="02040504050005020304" pitchFamily="18" charset="0"/>
               </a:rPr>
-              <a:t>In this study, we will be measuring listeners’  perceptual adaptation to 2 simulated talkers’ S-ʃ production.</a:t>
+              <a:t>In this study, we will be measuring listeners’ perceptual adaptation to two simulated talkers’ S-ʃ production.</a:t>
             </a:r>
           </a:p>
         </p:txBody>
@@ -4420,7 +4420,7 @@
         </p:nvSpPr>
         <p:spPr>
           <a:xfrm>
-            <a:off x="16981174" y="12091790"/>
+            <a:off x="17001783" y="12247243"/>
             <a:ext cx="11653486" cy="1754326"/>
           </a:xfrm>
           <a:prstGeom prst="rect">
@@ -4543,7 +4543,7 @@
         </p:blipFill>
         <p:spPr>
           <a:xfrm>
-            <a:off x="44956176" y="814380"/>
+            <a:off x="44817198" y="814380"/>
             <a:ext cx="3418112" cy="3147615"/>
           </a:xfrm>
           <a:prstGeom prst="rect">
@@ -4690,7 +4690,7 @@
                 </a:solidFill>
                 <a:latin typeface="Amasis MT Pro" panose="02040504050005020304" pitchFamily="18" charset="0"/>
               </a:rPr>
-              <a:t>Participants will be instructed to attend to either the female talker or the male talker. They will then perform a series of 2-option forced-choice lexical decision tasks where they hear a recording and then  select on their screen if this talker said a word or a nonword (</a:t>
+              <a:t>Participants will be instructed to attend to either the female talker or the male talker. They will then perform a series of 2-option forced-choice lexical decision tasks, in which they hear a recording and then select on their screen if this talker said a word or a nonword (</a:t>
             </a:r>
             <a:r>
               <a:rPr lang="en-US" sz="3600" i="1" dirty="0">
@@ -5002,7 +5002,7 @@
               <a:rPr lang="en-US" sz="3600" dirty="0">
                 <a:latin typeface="Amasis MT Pro" panose="02040504050005020304" pitchFamily="18" charset="0"/>
               </a:rPr>
-              <a:t>where one talker is played in the left ear, and the other in the right. Like talker gender, ear assignment was counterbalanced across participants.</a:t>
+              <a:t>where one talker is played in the left ear, and the other in the right ear. Like talker gender, ear assignment was counterbalanced across participants.</a:t>
             </a:r>
           </a:p>
         </p:txBody>
@@ -5304,7 +5304,7 @@
               <a:rPr lang="en-US" sz="3600" dirty="0">
                 <a:latin typeface="Amasis MT Pro" panose="02040504050005020304" pitchFamily="18" charset="0"/>
               </a:rPr>
-              <a:t>). The other half of the participants will hear the inverse, meaning Material B will be accented and Materials A will not be </a:t>
+              <a:t>). The other half of the participants will hear the inverse, meaning Materials B will be accented and Materials A will not be </a:t>
             </a:r>
             <a:r>
               <a:rPr lang="en-US" sz="3600" i="1" dirty="0">
@@ -5396,7 +5396,7 @@
                 </a:solidFill>
                 <a:latin typeface="Amasis MT Pro" panose="02040504050005020304" pitchFamily="18" charset="0"/>
               </a:rPr>
-              <a:t>Each experiment consist </a:t>
+              <a:t>Each experiment consists </a:t>
             </a:r>
             <a:r>
               <a:rPr lang="en-US" sz="3600" b="1" dirty="0">
@@ -5459,7 +5459,7 @@
                 </a:solidFill>
                 <a:latin typeface="Amasis MT Pro" panose="02040504050005020304" pitchFamily="18" charset="0"/>
               </a:rPr>
-              <a:t>trials. During filler trials, one talker will say a word, and the other talker will say a nonword.  </a:t>
+              <a:t>trials. During filler trials, one talker will say a word and the other talker will say a nonword. Each talker has a 50% chance of saying a nonword.</a:t>
             </a:r>
           </a:p>
         </p:txBody>
@@ -5939,7 +5939,7 @@
                 </a:solidFill>
                 <a:latin typeface="Amasis MT Pro" panose="02040504050005020304" pitchFamily="18" charset="0"/>
               </a:rPr>
-              <a:t> test continuum across trials in both talkers’ voices. Each trials will only play a recording from a single voice at once. Participants will select if the audio they heard was “</a:t>
+              <a:t> test continuum across trials in both talkers’ voices. Each trial will only play a recording from a single voice at once. Participants will select if the audio they heard was “</a:t>
             </a:r>
             <a:r>
               <a:rPr lang="en-US" sz="3600" dirty="0" err="1">
@@ -6438,7 +6438,31 @@
                 </a:solidFill>
                 <a:latin typeface="Amasis MT Pro" panose="02040504050005020304" pitchFamily="18" charset="0"/>
               </a:rPr>
-              <a:t>This project was funded by the University of Rochester Weissman summer fellowship in brain and cognitive sciences.</a:t>
+              <a:t>This project was funded by the University of Rochester </a:t>
+            </a:r>
+            <a:r>
+              <a:rPr lang="en-US" sz="3200" dirty="0" err="1">
+                <a:solidFill>
+                  <a:schemeClr val="tx1">
+                    <a:lumMod val="85000"/>
+                    <a:lumOff val="15000"/>
+                  </a:schemeClr>
+                </a:solidFill>
+                <a:latin typeface="Amasis MT Pro" panose="02040504050005020304" pitchFamily="18" charset="0"/>
+              </a:rPr>
+              <a:t>Wiesman</a:t>
+            </a:r>
+            <a:r>
+              <a:rPr lang="en-US" sz="3200" dirty="0">
+                <a:solidFill>
+                  <a:schemeClr val="tx1">
+                    <a:lumMod val="85000"/>
+                    <a:lumOff val="15000"/>
+                  </a:schemeClr>
+                </a:solidFill>
+                <a:latin typeface="Amasis MT Pro" panose="02040504050005020304" pitchFamily="18" charset="0"/>
+              </a:rPr>
+              <a:t> summer fellowship in brain and cognitive sciences.</a:t>
             </a:r>
           </a:p>
         </p:txBody>

</xml_diff>

<commit_message>
Draft 2 of Abstract and Poster for Summer Fellowship
</commit_message>
<xml_diff>
--- a/Fellowship Conference 2022/Poster.pptx
+++ b/Fellowship Conference 2022/Poster.pptx
@@ -123,6 +123,12 @@
 </p:presentation>
 </file>
 
+<file path=ppt/authors.xml><?xml version="1.0" encoding="utf-8"?>
+<p188:authorLst xmlns:a="http://schemas.openxmlformats.org/drawingml/2006/main" xmlns:r="http://schemas.openxmlformats.org/officeDocument/2006/relationships" xmlns:p188="http://schemas.microsoft.com/office/powerpoint/2018/8/main">
+  <p188:author id="{84CCC4C4-3CBA-4FF9-BA5A-9DC216B9FFCE}" name="Sabatello, Rachel" initials="SR" userId="S::rsabatel@ur.rochester.edu::4618ec3c-c9ed-4492-bc71-5fcc1a20f431" providerId="AD"/>
+</p188:authorLst>
+</file>
+
 <file path=ppt/slideLayouts/slideLayout1.xml><?xml version="1.0" encoding="utf-8"?>
 <p:sldLayout xmlns:a="http://schemas.openxmlformats.org/drawingml/2006/main" xmlns:r="http://schemas.openxmlformats.org/officeDocument/2006/relationships" xmlns:p="http://schemas.openxmlformats.org/presentationml/2006/main" type="title" preserve="1">
   <p:cSld name="Title Slide">
@@ -254,7 +260,7 @@
           <a:p>
             <a:fld id="{215A6F6B-4740-4ABA-990A-DB123C3F0656}" type="datetimeFigureOut">
               <a:rPr lang="en-US" smtClean="0"/>
-              <a:t>7/26/2022</a:t>
+              <a:t>7/28/2022</a:t>
             </a:fld>
             <a:endParaRPr lang="en-US"/>
           </a:p>
@@ -424,7 +430,7 @@
           <a:p>
             <a:fld id="{215A6F6B-4740-4ABA-990A-DB123C3F0656}" type="datetimeFigureOut">
               <a:rPr lang="en-US" smtClean="0"/>
-              <a:t>7/26/2022</a:t>
+              <a:t>7/28/2022</a:t>
             </a:fld>
             <a:endParaRPr lang="en-US"/>
           </a:p>
@@ -604,7 +610,7 @@
           <a:p>
             <a:fld id="{215A6F6B-4740-4ABA-990A-DB123C3F0656}" type="datetimeFigureOut">
               <a:rPr lang="en-US" smtClean="0"/>
-              <a:t>7/26/2022</a:t>
+              <a:t>7/28/2022</a:t>
             </a:fld>
             <a:endParaRPr lang="en-US"/>
           </a:p>
@@ -774,7 +780,7 @@
           <a:p>
             <a:fld id="{215A6F6B-4740-4ABA-990A-DB123C3F0656}" type="datetimeFigureOut">
               <a:rPr lang="en-US" smtClean="0"/>
-              <a:t>7/26/2022</a:t>
+              <a:t>7/28/2022</a:t>
             </a:fld>
             <a:endParaRPr lang="en-US"/>
           </a:p>
@@ -1018,7 +1024,7 @@
           <a:p>
             <a:fld id="{215A6F6B-4740-4ABA-990A-DB123C3F0656}" type="datetimeFigureOut">
               <a:rPr lang="en-US" smtClean="0"/>
-              <a:t>7/26/2022</a:t>
+              <a:t>7/28/2022</a:t>
             </a:fld>
             <a:endParaRPr lang="en-US"/>
           </a:p>
@@ -1250,7 +1256,7 @@
           <a:p>
             <a:fld id="{215A6F6B-4740-4ABA-990A-DB123C3F0656}" type="datetimeFigureOut">
               <a:rPr lang="en-US" smtClean="0"/>
-              <a:t>7/26/2022</a:t>
+              <a:t>7/28/2022</a:t>
             </a:fld>
             <a:endParaRPr lang="en-US"/>
           </a:p>
@@ -1617,7 +1623,7 @@
           <a:p>
             <a:fld id="{215A6F6B-4740-4ABA-990A-DB123C3F0656}" type="datetimeFigureOut">
               <a:rPr lang="en-US" smtClean="0"/>
-              <a:t>7/26/2022</a:t>
+              <a:t>7/28/2022</a:t>
             </a:fld>
             <a:endParaRPr lang="en-US"/>
           </a:p>
@@ -1735,7 +1741,7 @@
           <a:p>
             <a:fld id="{215A6F6B-4740-4ABA-990A-DB123C3F0656}" type="datetimeFigureOut">
               <a:rPr lang="en-US" smtClean="0"/>
-              <a:t>7/26/2022</a:t>
+              <a:t>7/28/2022</a:t>
             </a:fld>
             <a:endParaRPr lang="en-US"/>
           </a:p>
@@ -1830,7 +1836,7 @@
           <a:p>
             <a:fld id="{215A6F6B-4740-4ABA-990A-DB123C3F0656}" type="datetimeFigureOut">
               <a:rPr lang="en-US" smtClean="0"/>
-              <a:t>7/26/2022</a:t>
+              <a:t>7/28/2022</a:t>
             </a:fld>
             <a:endParaRPr lang="en-US"/>
           </a:p>
@@ -2107,7 +2113,7 @@
           <a:p>
             <a:fld id="{215A6F6B-4740-4ABA-990A-DB123C3F0656}" type="datetimeFigureOut">
               <a:rPr lang="en-US" smtClean="0"/>
-              <a:t>7/26/2022</a:t>
+              <a:t>7/28/2022</a:t>
             </a:fld>
             <a:endParaRPr lang="en-US"/>
           </a:p>
@@ -2364,7 +2370,7 @@
           <a:p>
             <a:fld id="{215A6F6B-4740-4ABA-990A-DB123C3F0656}" type="datetimeFigureOut">
               <a:rPr lang="en-US" smtClean="0"/>
-              <a:t>7/26/2022</a:t>
+              <a:t>7/28/2022</a:t>
             </a:fld>
             <a:endParaRPr lang="en-US"/>
           </a:p>
@@ -2577,7 +2583,7 @@
           <a:p>
             <a:fld id="{215A6F6B-4740-4ABA-990A-DB123C3F0656}" type="datetimeFigureOut">
               <a:rPr lang="en-US" smtClean="0"/>
-              <a:t>7/26/2022</a:t>
+              <a:t>7/28/2022</a:t>
             </a:fld>
             <a:endParaRPr lang="en-US"/>
           </a:p>
@@ -2984,127 +2990,10 @@
       </p:grpSpPr>
       <p:sp>
         <p:nvSpPr>
-          <p:cNvPr id="7" name="TextBox 6">
+          <p:cNvPr id="85" name="Rectangle: Rounded Corners 84">
             <a:extLst>
               <a:ext uri="{FF2B5EF4-FFF2-40B4-BE49-F238E27FC236}">
-                <a16:creationId xmlns:a16="http://schemas.microsoft.com/office/drawing/2014/main" id="{73A14B5B-7C35-C021-73E3-2F99CF4D5971}"/>
-              </a:ext>
-            </a:extLst>
-          </p:cNvPr>
-          <p:cNvSpPr txBox="1"/>
-          <p:nvPr/>
-        </p:nvSpPr>
-        <p:spPr>
-          <a:xfrm>
-            <a:off x="17088380" y="600467"/>
-            <a:ext cx="26727065" cy="1446550"/>
-          </a:xfrm>
-          <a:prstGeom prst="rect">
-            <a:avLst/>
-          </a:prstGeom>
-          <a:noFill/>
-        </p:spPr>
-        <p:txBody>
-          <a:bodyPr wrap="square" rtlCol="0">
-            <a:spAutoFit/>
-          </a:bodyPr>
-          <a:lstStyle/>
-          <a:p>
-            <a:pPr algn="ctr"/>
-            <a:r>
-              <a:rPr lang="en-US" sz="8800" dirty="0">
-                <a:solidFill>
-                  <a:srgbClr val="283F19"/>
-                </a:solidFill>
-                <a:latin typeface="Amasis MT Pro Medium" panose="020B0604020202020204" pitchFamily="18" charset="0"/>
-              </a:rPr>
-              <a:t>Talker Interference in Speech Perception Adaptation </a:t>
-            </a:r>
-          </a:p>
-        </p:txBody>
-      </p:sp>
-      <p:sp>
-        <p:nvSpPr>
-          <p:cNvPr id="8" name="TextBox 7">
-            <a:extLst>
-              <a:ext uri="{FF2B5EF4-FFF2-40B4-BE49-F238E27FC236}">
-                <a16:creationId xmlns:a16="http://schemas.microsoft.com/office/drawing/2014/main" id="{A0854D7A-1F6C-5E9E-C966-7041A1111844}"/>
-              </a:ext>
-            </a:extLst>
-          </p:cNvPr>
-          <p:cNvSpPr txBox="1"/>
-          <p:nvPr/>
-        </p:nvSpPr>
-        <p:spPr>
-          <a:xfrm>
-            <a:off x="16939400" y="2211237"/>
-            <a:ext cx="28016776" cy="923330"/>
-          </a:xfrm>
-          <a:prstGeom prst="rect">
-            <a:avLst/>
-          </a:prstGeom>
-          <a:noFill/>
-        </p:spPr>
-        <p:txBody>
-          <a:bodyPr wrap="square" rtlCol="0">
-            <a:spAutoFit/>
-          </a:bodyPr>
-          <a:lstStyle/>
-          <a:p>
-            <a:pPr algn="ctr"/>
-            <a:r>
-              <a:rPr lang="en-US" sz="5400" dirty="0">
-                <a:latin typeface="Amasis MT Pro" panose="02040504050005020304" pitchFamily="18" charset="0"/>
-              </a:rPr>
-              <a:t>Rachel Sabatello, Shawn Cummings, &amp; Florian Jaeger</a:t>
-            </a:r>
-          </a:p>
-        </p:txBody>
-      </p:sp>
-      <p:sp>
-        <p:nvSpPr>
-          <p:cNvPr id="22" name="TextBox 21">
-            <a:extLst>
-              <a:ext uri="{FF2B5EF4-FFF2-40B4-BE49-F238E27FC236}">
-                <a16:creationId xmlns:a16="http://schemas.microsoft.com/office/drawing/2014/main" id="{4541F617-F08C-8A6A-ECFB-D092ED08315D}"/>
-              </a:ext>
-            </a:extLst>
-          </p:cNvPr>
-          <p:cNvSpPr txBox="1"/>
-          <p:nvPr/>
-        </p:nvSpPr>
-        <p:spPr>
-          <a:xfrm>
-            <a:off x="17533186" y="3161019"/>
-            <a:ext cx="26848386" cy="707886"/>
-          </a:xfrm>
-          <a:prstGeom prst="rect">
-            <a:avLst/>
-          </a:prstGeom>
-          <a:noFill/>
-        </p:spPr>
-        <p:txBody>
-          <a:bodyPr wrap="square" rtlCol="0">
-            <a:spAutoFit/>
-          </a:bodyPr>
-          <a:lstStyle/>
-          <a:p>
-            <a:pPr algn="ctr"/>
-            <a:r>
-              <a:rPr lang="en-US" sz="4000" dirty="0">
-                <a:latin typeface="Amasis MT Pro" panose="02040504050005020304" pitchFamily="18" charset="0"/>
-              </a:rPr>
-              <a:t>University of Rochester, Dept. of Brain &amp; Cognitive Sciences</a:t>
-            </a:r>
-          </a:p>
-        </p:txBody>
-      </p:sp>
-      <p:sp>
-        <p:nvSpPr>
-          <p:cNvPr id="2" name="Rectangle: Rounded Corners 1">
-            <a:extLst>
-              <a:ext uri="{FF2B5EF4-FFF2-40B4-BE49-F238E27FC236}">
-                <a16:creationId xmlns:a16="http://schemas.microsoft.com/office/drawing/2014/main" id="{8ED8162F-6C87-A748-480B-3C77A3CAF189}"/>
+                <a16:creationId xmlns:a16="http://schemas.microsoft.com/office/drawing/2014/main" id="{CDA1C932-90EB-B114-01F2-C29328346882}"/>
               </a:ext>
             </a:extLst>
           </p:cNvPr>
@@ -3113,8 +3002,8 @@
         </p:nvSpPr>
         <p:spPr>
           <a:xfrm>
-            <a:off x="1003312" y="923980"/>
-            <a:ext cx="15015033" cy="994900"/>
+            <a:off x="827833" y="8934026"/>
+            <a:ext cx="15297174" cy="882695"/>
           </a:xfrm>
           <a:prstGeom prst="roundRect">
             <a:avLst/>
@@ -3155,7 +3044,7 @@
                 </a:solidFill>
                 <a:latin typeface="Amasis MT Pro Medium" panose="02040604050005020304" pitchFamily="18" charset="0"/>
               </a:rPr>
-              <a:t>Background</a:t>
+              <a:t> Hypothesis</a:t>
             </a:r>
             <a:endParaRPr lang="en-US" sz="6000" dirty="0">
               <a:solidFill>
@@ -3170,10 +3059,181 @@
       </p:sp>
       <p:sp>
         <p:nvSpPr>
-          <p:cNvPr id="28" name="Rectangle: Rounded Corners 27">
+          <p:cNvPr id="7" name="TextBox 6">
             <a:extLst>
               <a:ext uri="{FF2B5EF4-FFF2-40B4-BE49-F238E27FC236}">
-                <a16:creationId xmlns:a16="http://schemas.microsoft.com/office/drawing/2014/main" id="{59E7D24B-C582-9569-B523-E98AE3E64EE5}"/>
+                <a16:creationId xmlns:a16="http://schemas.microsoft.com/office/drawing/2014/main" id="{73A14B5B-7C35-C021-73E3-2F99CF4D5971}"/>
+              </a:ext>
+            </a:extLst>
+          </p:cNvPr>
+          <p:cNvSpPr txBox="1"/>
+          <p:nvPr/>
+        </p:nvSpPr>
+        <p:spPr>
+          <a:xfrm>
+            <a:off x="15672512" y="853405"/>
+            <a:ext cx="29927286" cy="1323439"/>
+          </a:xfrm>
+          <a:prstGeom prst="rect">
+            <a:avLst/>
+          </a:prstGeom>
+          <a:noFill/>
+        </p:spPr>
+        <p:txBody>
+          <a:bodyPr wrap="square" rtlCol="0">
+            <a:spAutoFit/>
+          </a:bodyPr>
+          <a:lstStyle/>
+          <a:p>
+            <a:pPr algn="ctr"/>
+            <a:r>
+              <a:rPr lang="en-US" sz="7700" dirty="0">
+                <a:solidFill>
+                  <a:srgbClr val="283F19"/>
+                </a:solidFill>
+                <a:latin typeface="Amasis MT Pro Medium" panose="020B0604020202020204" pitchFamily="18" charset="0"/>
+              </a:rPr>
+              <a:t>Exploring the Automaticity Speech Perception and Adaptation </a:t>
+            </a:r>
+          </a:p>
+        </p:txBody>
+      </p:sp>
+      <p:sp>
+        <p:nvSpPr>
+          <p:cNvPr id="8" name="TextBox 7">
+            <a:extLst>
+              <a:ext uri="{FF2B5EF4-FFF2-40B4-BE49-F238E27FC236}">
+                <a16:creationId xmlns:a16="http://schemas.microsoft.com/office/drawing/2014/main" id="{A0854D7A-1F6C-5E9E-C966-7041A1111844}"/>
+              </a:ext>
+            </a:extLst>
+          </p:cNvPr>
+          <p:cNvSpPr txBox="1"/>
+          <p:nvPr/>
+        </p:nvSpPr>
+        <p:spPr>
+          <a:xfrm>
+            <a:off x="16939400" y="2211237"/>
+            <a:ext cx="28016776" cy="769441"/>
+          </a:xfrm>
+          <a:prstGeom prst="rect">
+            <a:avLst/>
+          </a:prstGeom>
+          <a:noFill/>
+        </p:spPr>
+        <p:txBody>
+          <a:bodyPr wrap="square" rtlCol="0">
+            <a:spAutoFit/>
+          </a:bodyPr>
+          <a:lstStyle/>
+          <a:p>
+            <a:pPr algn="ctr"/>
+            <a:r>
+              <a:rPr lang="en-US" sz="4400" dirty="0">
+                <a:latin typeface="Amasis MT Pro" panose="02040504050005020304" pitchFamily="18" charset="0"/>
+              </a:rPr>
+              <a:t>Rachel Sabatello</a:t>
+            </a:r>
+            <a:r>
+              <a:rPr lang="en-US" sz="4400" baseline="30000" dirty="0">
+                <a:latin typeface="Amasis MT Pro" panose="02040504050005020304" pitchFamily="18" charset="0"/>
+              </a:rPr>
+              <a:t>1</a:t>
+            </a:r>
+            <a:r>
+              <a:rPr lang="en-US" sz="4400" dirty="0">
+                <a:latin typeface="Amasis MT Pro" panose="02040504050005020304" pitchFamily="18" charset="0"/>
+              </a:rPr>
+              <a:t>, Shawn Cummings</a:t>
+            </a:r>
+            <a:r>
+              <a:rPr lang="en-US" sz="4400" baseline="30000" dirty="0">
+                <a:latin typeface="Amasis MT Pro" panose="02040504050005020304" pitchFamily="18" charset="0"/>
+              </a:rPr>
+              <a:t>2</a:t>
+            </a:r>
+            <a:r>
+              <a:rPr lang="en-US" sz="4400" dirty="0">
+                <a:latin typeface="Amasis MT Pro" panose="02040504050005020304" pitchFamily="18" charset="0"/>
+              </a:rPr>
+              <a:t>, &amp; Florian Jaeger</a:t>
+            </a:r>
+            <a:r>
+              <a:rPr lang="en-US" sz="4400" baseline="30000" dirty="0">
+                <a:latin typeface="Amasis MT Pro" panose="02040504050005020304" pitchFamily="18" charset="0"/>
+              </a:rPr>
+              <a:t>1</a:t>
+            </a:r>
+            <a:endParaRPr lang="en-US" sz="4400" dirty="0">
+              <a:latin typeface="Amasis MT Pro" panose="02040504050005020304" pitchFamily="18" charset="0"/>
+            </a:endParaRPr>
+          </a:p>
+        </p:txBody>
+      </p:sp>
+      <p:sp>
+        <p:nvSpPr>
+          <p:cNvPr id="22" name="TextBox 21">
+            <a:extLst>
+              <a:ext uri="{FF2B5EF4-FFF2-40B4-BE49-F238E27FC236}">
+                <a16:creationId xmlns:a16="http://schemas.microsoft.com/office/drawing/2014/main" id="{4541F617-F08C-8A6A-ECFB-D092ED08315D}"/>
+              </a:ext>
+            </a:extLst>
+          </p:cNvPr>
+          <p:cNvSpPr txBox="1"/>
+          <p:nvPr/>
+        </p:nvSpPr>
+        <p:spPr>
+          <a:xfrm>
+            <a:off x="17523595" y="2977550"/>
+            <a:ext cx="26848386" cy="1015663"/>
+          </a:xfrm>
+          <a:prstGeom prst="rect">
+            <a:avLst/>
+          </a:prstGeom>
+          <a:noFill/>
+        </p:spPr>
+        <p:txBody>
+          <a:bodyPr wrap="square" rtlCol="0">
+            <a:spAutoFit/>
+          </a:bodyPr>
+          <a:lstStyle/>
+          <a:p>
+            <a:pPr algn="ctr"/>
+            <a:r>
+              <a:rPr lang="en-US" sz="3000" baseline="30000" dirty="0">
+                <a:latin typeface="Amasis MT Pro" panose="02040504050005020304" pitchFamily="18" charset="0"/>
+              </a:rPr>
+              <a:t>1</a:t>
+            </a:r>
+            <a:r>
+              <a:rPr lang="en-US" sz="3000" dirty="0">
+                <a:latin typeface="Amasis MT Pro" panose="02040504050005020304" pitchFamily="18" charset="0"/>
+              </a:rPr>
+              <a:t>University of Rochester, Department of Brain and Cognitive Sciences</a:t>
+            </a:r>
+          </a:p>
+          <a:p>
+            <a:pPr algn="ctr"/>
+            <a:r>
+              <a:rPr lang="en-US" sz="3000" baseline="30000" dirty="0">
+                <a:latin typeface="Amasis MT Pro" panose="02040504050005020304" pitchFamily="18" charset="0"/>
+              </a:rPr>
+              <a:t>2</a:t>
+            </a:r>
+            <a:r>
+              <a:rPr lang="en-US" sz="3000" dirty="0">
+                <a:latin typeface="Amasis MT Pro" panose="02040504050005020304" pitchFamily="18" charset="0"/>
+              </a:rPr>
+              <a:t>University of Connecticut, Speech, Language, and Hearing Sciences</a:t>
+            </a:r>
+          </a:p>
+        </p:txBody>
+      </p:sp>
+      <p:sp>
+        <p:nvSpPr>
+          <p:cNvPr id="2" name="Rectangle: Rounded Corners 1">
+            <a:extLst>
+              <a:ext uri="{FF2B5EF4-FFF2-40B4-BE49-F238E27FC236}">
+                <a16:creationId xmlns:a16="http://schemas.microsoft.com/office/drawing/2014/main" id="{8ED8162F-6C87-A748-480B-3C77A3CAF189}"/>
               </a:ext>
             </a:extLst>
           </p:cNvPr>
@@ -3182,8 +3242,8 @@
         </p:nvSpPr>
         <p:spPr>
           <a:xfrm>
-            <a:off x="16442763" y="27663249"/>
-            <a:ext cx="21926992" cy="830997"/>
+            <a:off x="830122" y="1010462"/>
+            <a:ext cx="15335183" cy="729596"/>
           </a:xfrm>
           <a:prstGeom prst="roundRect">
             <a:avLst/>
@@ -3224,7 +3284,7 @@
                 </a:solidFill>
                 <a:latin typeface="Amasis MT Pro Medium" panose="02040604050005020304" pitchFamily="18" charset="0"/>
               </a:rPr>
-              <a:t>References</a:t>
+              <a:t>Background</a:t>
             </a:r>
             <a:endParaRPr lang="en-US" sz="6000" dirty="0">
               <a:solidFill>
@@ -3239,10 +3299,10 @@
       </p:sp>
       <p:sp>
         <p:nvSpPr>
-          <p:cNvPr id="29" name="Rectangle: Rounded Corners 28">
+          <p:cNvPr id="28" name="Rectangle: Rounded Corners 27">
             <a:extLst>
               <a:ext uri="{FF2B5EF4-FFF2-40B4-BE49-F238E27FC236}">
-                <a16:creationId xmlns:a16="http://schemas.microsoft.com/office/drawing/2014/main" id="{7290EAC8-ED38-AF21-E3C3-0CF2DB64C23B}"/>
+                <a16:creationId xmlns:a16="http://schemas.microsoft.com/office/drawing/2014/main" id="{59E7D24B-C582-9569-B523-E98AE3E64EE5}"/>
               </a:ext>
             </a:extLst>
           </p:cNvPr>
@@ -3251,8 +3311,8 @@
         </p:nvSpPr>
         <p:spPr>
           <a:xfrm>
-            <a:off x="16711064" y="4124176"/>
-            <a:ext cx="31363568" cy="673673"/>
+            <a:off x="16936458" y="27766557"/>
+            <a:ext cx="19360853" cy="813098"/>
           </a:xfrm>
           <a:prstGeom prst="roundRect">
             <a:avLst/>
@@ -3284,6 +3344,75 @@
           <a:bodyPr rtlCol="0" anchor="ctr"/>
           <a:lstStyle/>
           <a:p>
+            <a:r>
+              <a:rPr lang="en-US" sz="5400" dirty="0">
+                <a:solidFill>
+                  <a:schemeClr val="bg2">
+                    <a:lumMod val="25000"/>
+                  </a:schemeClr>
+                </a:solidFill>
+                <a:latin typeface="Amasis MT Pro Medium" panose="02040604050005020304" pitchFamily="18" charset="0"/>
+              </a:rPr>
+              <a:t>References</a:t>
+            </a:r>
+            <a:endParaRPr lang="en-US" sz="6000" dirty="0">
+              <a:solidFill>
+                <a:schemeClr val="bg2">
+                  <a:lumMod val="25000"/>
+                </a:schemeClr>
+              </a:solidFill>
+              <a:latin typeface="Amasis MT Pro Medium" panose="02040604050005020304" pitchFamily="18" charset="0"/>
+            </a:endParaRPr>
+          </a:p>
+        </p:txBody>
+      </p:sp>
+      <p:sp>
+        <p:nvSpPr>
+          <p:cNvPr id="29" name="Rectangle: Rounded Corners 28">
+            <a:extLst>
+              <a:ext uri="{FF2B5EF4-FFF2-40B4-BE49-F238E27FC236}">
+                <a16:creationId xmlns:a16="http://schemas.microsoft.com/office/drawing/2014/main" id="{7290EAC8-ED38-AF21-E3C3-0CF2DB64C23B}"/>
+              </a:ext>
+            </a:extLst>
+          </p:cNvPr>
+          <p:cNvSpPr/>
+          <p:nvPr/>
+        </p:nvSpPr>
+        <p:spPr>
+          <a:xfrm>
+            <a:off x="16939399" y="4043716"/>
+            <a:ext cx="31119871" cy="871332"/>
+          </a:xfrm>
+          <a:prstGeom prst="roundRect">
+            <a:avLst/>
+          </a:prstGeom>
+          <a:solidFill>
+            <a:srgbClr val="D1DFA9"/>
+          </a:solidFill>
+          <a:ln>
+            <a:noFill/>
+          </a:ln>
+        </p:spPr>
+        <p:style>
+          <a:lnRef idx="2">
+            <a:schemeClr val="accent1">
+              <a:shade val="50000"/>
+            </a:schemeClr>
+          </a:lnRef>
+          <a:fillRef idx="1">
+            <a:schemeClr val="accent1"/>
+          </a:fillRef>
+          <a:effectRef idx="0">
+            <a:schemeClr val="accent1"/>
+          </a:effectRef>
+          <a:fontRef idx="minor">
+            <a:schemeClr val="lt1"/>
+          </a:fontRef>
+        </p:style>
+        <p:txBody>
+          <a:bodyPr rtlCol="0" anchor="ctr"/>
+          <a:lstStyle/>
+          <a:p>
             <a:pPr algn="ctr"/>
             <a:r>
               <a:rPr lang="en-US" sz="5400" dirty="0">
@@ -3321,10 +3450,10 @@
         </p:nvGrpSpPr>
         <p:grpSpPr>
           <a:xfrm>
-            <a:off x="1085690" y="8702903"/>
-            <a:ext cx="14850275" cy="3339946"/>
+            <a:off x="827900" y="8625298"/>
+            <a:ext cx="15333038" cy="4413792"/>
             <a:chOff x="936163" y="12563362"/>
-            <a:chExt cx="15242728" cy="3692383"/>
+            <a:chExt cx="15249277" cy="4536707"/>
           </a:xfrm>
         </p:grpSpPr>
         <p:sp>
@@ -3341,8 +3470,8 @@
           </p:nvSpPr>
           <p:spPr>
             <a:xfrm>
-              <a:off x="936163" y="14037837"/>
-              <a:ext cx="15242726" cy="1811664"/>
+              <a:off x="942714" y="13935710"/>
+              <a:ext cx="15242726" cy="3164359"/>
             </a:xfrm>
             <a:prstGeom prst="rect">
               <a:avLst/>
@@ -3357,7 +3486,7 @@
             <a:p>
               <a:pPr algn="ctr"/>
               <a:r>
-                <a:rPr lang="en-US" sz="3800" dirty="0">
+                <a:rPr lang="en-US" sz="3600" dirty="0">
                   <a:solidFill>
                     <a:schemeClr val="tx1">
                       <a:lumMod val="85000"/>
@@ -3367,9 +3496,9 @@
                   <a:latin typeface="Amasis MT Pro" panose="02040504050005020304" pitchFamily="18" charset="0"/>
                   <a:cs typeface="Angsana New" panose="02020603050405020304" pitchFamily="18" charset="-34"/>
                 </a:rPr>
-                <a:t>When listening to two talkers speak simultaneously, listeners will change their perceived categorical boundary more for the talker they are instructed to attend to compared to the unattended second talker. </a:t>
+                <a:t>We hypothesize that speech perception adaptation is contingent upon attention. If there are limits to the automaticity of speech perception, then we expect listeners will adapt their perceived categorical boundary to align better with the speech of the talker they are instructed to attend to compared to the unattended talker. </a:t>
               </a:r>
-              <a:endParaRPr lang="en-US" sz="3600" dirty="0">
+              <a:endParaRPr lang="en-US" sz="3200" dirty="0">
                 <a:solidFill>
                   <a:schemeClr val="tx1">
                     <a:lumMod val="85000"/>
@@ -3378,75 +3507,6 @@
                 </a:solidFill>
                 <a:latin typeface="Amasis MT Pro" panose="02040504050005020304" pitchFamily="18" charset="0"/>
                 <a:cs typeface="Angsana New" panose="02020603050405020304" pitchFamily="18" charset="-34"/>
-              </a:endParaRPr>
-            </a:p>
-          </p:txBody>
-        </p:sp>
-        <p:sp>
-          <p:nvSpPr>
-            <p:cNvPr id="25" name="Rectangle: Rounded Corners 24">
-              <a:extLst>
-                <a:ext uri="{FF2B5EF4-FFF2-40B4-BE49-F238E27FC236}">
-                  <a16:creationId xmlns:a16="http://schemas.microsoft.com/office/drawing/2014/main" id="{EB16B1F6-73B7-1DB2-C37C-3627827F3731}"/>
-                </a:ext>
-              </a:extLst>
-            </p:cNvPr>
-            <p:cNvSpPr/>
-            <p:nvPr/>
-          </p:nvSpPr>
-          <p:spPr>
-            <a:xfrm>
-              <a:off x="936165" y="12871651"/>
-              <a:ext cx="15242726" cy="953612"/>
-            </a:xfrm>
-            <a:prstGeom prst="roundRect">
-              <a:avLst/>
-            </a:prstGeom>
-            <a:solidFill>
-              <a:srgbClr val="D1DFA9"/>
-            </a:solidFill>
-            <a:ln>
-              <a:noFill/>
-            </a:ln>
-          </p:spPr>
-          <p:style>
-            <a:lnRef idx="2">
-              <a:schemeClr val="accent1">
-                <a:shade val="50000"/>
-              </a:schemeClr>
-            </a:lnRef>
-            <a:fillRef idx="1">
-              <a:schemeClr val="accent1"/>
-            </a:fillRef>
-            <a:effectRef idx="0">
-              <a:schemeClr val="accent1"/>
-            </a:effectRef>
-            <a:fontRef idx="minor">
-              <a:schemeClr val="lt1"/>
-            </a:fontRef>
-          </p:style>
-          <p:txBody>
-            <a:bodyPr rtlCol="0" anchor="ctr"/>
-            <a:lstStyle/>
-            <a:p>
-              <a:r>
-                <a:rPr lang="en-US" sz="5400" dirty="0">
-                  <a:solidFill>
-                    <a:schemeClr val="bg2">
-                      <a:lumMod val="25000"/>
-                    </a:schemeClr>
-                  </a:solidFill>
-                  <a:latin typeface="Amasis MT Pro Medium" panose="02040604050005020304" pitchFamily="18" charset="0"/>
-                </a:rPr>
-                <a:t>Hypothesis</a:t>
-              </a:r>
-              <a:endParaRPr lang="en-US" sz="6000" dirty="0">
-                <a:solidFill>
-                  <a:schemeClr val="bg2">
-                    <a:lumMod val="25000"/>
-                  </a:schemeClr>
-                </a:solidFill>
-                <a:latin typeface="Amasis MT Pro Medium" panose="02040604050005020304" pitchFamily="18" charset="0"/>
               </a:endParaRPr>
             </a:p>
           </p:txBody>
@@ -3466,7 +3526,7 @@
           <p:spPr>
             <a:xfrm>
               <a:off x="936163" y="12563362"/>
-              <a:ext cx="15242726" cy="3692383"/>
+              <a:ext cx="15242726" cy="4513903"/>
             </a:xfrm>
             <a:prstGeom prst="roundRect">
               <a:avLst/>
@@ -3561,8 +3621,8 @@
         </p:nvSpPr>
         <p:spPr>
           <a:xfrm>
-            <a:off x="1142290" y="2022307"/>
-            <a:ext cx="14805359" cy="6575198"/>
+            <a:off x="830122" y="1807204"/>
+            <a:ext cx="15335184" cy="6575198"/>
           </a:xfrm>
           <a:prstGeom prst="rect">
             <a:avLst/>
@@ -3601,7 +3661,24 @@
                 <a:ea typeface="Calibri" panose="020F0502020204030204" pitchFamily="34" charset="0"/>
                 <a:cs typeface="Times New Roman" panose="02020603050405020304" pitchFamily="18" charset="0"/>
               </a:rPr>
-              <a:t>alkers differ in how they produce speech sounds, even when they share similar language backgrounds. Still, listeners understand newly encountered talkers when hearing them speak for the first time. To overcome speech variation, the brain actively learns how talkers speak, and constructs expectations about how that talker will produce speech in the future. Though this process often occurs without the listener noticing, it still requires cognitive resources. In this experiment, we will limit the available resources for speech perception by exposing a listener to two talkers speaking simultaneously. We will then test the effects of directing the listener’s attention to one talker on the listener’s ability adapt to both talkers.</a:t>
+              <a:t>alkers differ in how they produce speech sounds, even when they share similar language backgrounds. Still, listeners understand newly encountered talkers when hearing them speak for the first time. To overcome speech variation, the brain actively learns how talkers speak, and constructs expectations about how that talker will produce speech in the future. Though this process often occurs without the listener noticing,</a:t>
+            </a:r>
+            <a:r>
+              <a:rPr lang="en-US" sz="3600" dirty="0">
+                <a:latin typeface="Amasis MT Pro" panose="02040504050005020304" pitchFamily="18" charset="0"/>
+                <a:ea typeface="Calibri" panose="020F0502020204030204" pitchFamily="34" charset="0"/>
+                <a:cs typeface="Times New Roman" panose="02020603050405020304" pitchFamily="18" charset="0"/>
+              </a:rPr>
+              <a:t> how automatic speech perception adaptation is remains unclear. </a:t>
+            </a:r>
+            <a:r>
+              <a:rPr lang="en-US" sz="3600" dirty="0">
+                <a:effectLst/>
+                <a:latin typeface="Amasis MT Pro" panose="02040504050005020304" pitchFamily="18" charset="0"/>
+                <a:ea typeface="Calibri" panose="020F0502020204030204" pitchFamily="34" charset="0"/>
+                <a:cs typeface="Times New Roman" panose="02020603050405020304" pitchFamily="18" charset="0"/>
+              </a:rPr>
+              <a:t>In this experiment, we will limit the available attentional resources for speech perception by exposing a listener to two talkers speaking simultaneously. We will then test the effects of directing the listener’s attention to one talker on the listener’s ability to adapt to both talkers.</a:t>
             </a:r>
           </a:p>
         </p:txBody>
@@ -3620,8 +3697,8 @@
         </p:nvSpPr>
         <p:spPr>
           <a:xfrm>
-            <a:off x="16981174" y="5723255"/>
-            <a:ext cx="31175457" cy="2308324"/>
+            <a:off x="17302495" y="5831172"/>
+            <a:ext cx="30756775" cy="2308324"/>
           </a:xfrm>
           <a:prstGeom prst="rect">
             <a:avLst/>
@@ -3645,7 +3722,7 @@
                 </a:solidFill>
                 <a:latin typeface="Amasis MT Pro" panose="02040504050005020304" pitchFamily="18" charset="0"/>
               </a:rPr>
-              <a:t>S-ʃ sounds exist on a continuum, spanning from /s/ as in “Solid” to /</a:t>
+              <a:t>S-ʃ sounds exist on a continuum, spanning from /s/ as in “Sock” to /</a:t>
             </a:r>
             <a:r>
               <a:rPr lang="en-US" sz="3600" dirty="0" err="1">
@@ -3669,7 +3746,7 @@
                 </a:solidFill>
                 <a:latin typeface="Amasis MT Pro" panose="02040504050005020304" pitchFamily="18" charset="0"/>
               </a:rPr>
-              <a:t>/ as in “Shore.” Earlier research suggests that listener adaptation to talker S-ʃ production is </a:t>
+              <a:t>/ as in “Shock.” Earlier research suggests that listener adaptation to talker S-ʃ production is </a:t>
             </a:r>
             <a:r>
               <a:rPr lang="en-US" sz="3600" b="1" dirty="0">
@@ -3761,7 +3838,7 @@
                 </a:solidFill>
                 <a:latin typeface="Amasis MT Pro" panose="02040504050005020304" pitchFamily="18" charset="0"/>
               </a:rPr>
-              <a:t>(Cummings &amp; Theodore, </a:t>
+              <a:t>(Cummings &amp; Theodore, 2022</a:t>
             </a:r>
             <a:r>
               <a:rPr lang="en-US" sz="3600" i="1" dirty="0">
@@ -3773,7 +3850,7 @@
                 </a:solidFill>
                 <a:latin typeface="Amasis MT Pro" panose="02040504050005020304" pitchFamily="18" charset="0"/>
               </a:rPr>
-              <a:t>in press).</a:t>
+              <a:t>).</a:t>
             </a:r>
             <a:r>
               <a:rPr lang="en-US" sz="3600" dirty="0">
@@ -3809,7 +3886,7 @@
         </p:nvSpPr>
         <p:spPr>
           <a:xfrm>
-            <a:off x="21483018" y="4853017"/>
+            <a:off x="20611717" y="4961296"/>
             <a:ext cx="23873817" cy="677108"/>
           </a:xfrm>
           <a:prstGeom prst="rect">
@@ -3853,8 +3930,8 @@
         </p:nvSpPr>
         <p:spPr>
           <a:xfrm>
-            <a:off x="16561574" y="28507149"/>
-            <a:ext cx="21689369" cy="3539430"/>
+            <a:off x="16936459" y="28669352"/>
+            <a:ext cx="19360852" cy="3416320"/>
           </a:xfrm>
           <a:prstGeom prst="rect">
             <a:avLst/>
@@ -3868,7 +3945,7 @@
           <a:lstStyle/>
           <a:p>
             <a:r>
-              <a:rPr lang="en-US" sz="2800" dirty="0">
+              <a:rPr lang="en-US" sz="2700" dirty="0">
                 <a:solidFill>
                   <a:schemeClr val="tx1">
                     <a:lumMod val="85000"/>
@@ -3881,7 +3958,7 @@
               <a:t>Boersma, P. (2002). </a:t>
             </a:r>
             <a:r>
-              <a:rPr lang="en-US" sz="2800" dirty="0" err="1">
+              <a:rPr lang="en-US" sz="2700" dirty="0" err="1">
                 <a:solidFill>
                   <a:schemeClr val="tx1">
                     <a:lumMod val="85000"/>
@@ -3894,7 +3971,7 @@
               <a:t>Praat</a:t>
             </a:r>
             <a:r>
-              <a:rPr lang="en-US" sz="2800" dirty="0">
+              <a:rPr lang="en-US" sz="2700" dirty="0">
                 <a:solidFill>
                   <a:schemeClr val="tx1">
                     <a:lumMod val="85000"/>
@@ -3907,7 +3984,7 @@
               <a:t>, a system for doing phonetics by computer. </a:t>
             </a:r>
             <a:r>
-              <a:rPr lang="en-US" sz="2800" i="1" dirty="0" err="1">
+              <a:rPr lang="en-US" sz="2700" i="1" dirty="0" err="1">
                 <a:solidFill>
                   <a:schemeClr val="tx1">
                     <a:lumMod val="85000"/>
@@ -3920,7 +3997,7 @@
               <a:t>Glot</a:t>
             </a:r>
             <a:r>
-              <a:rPr lang="en-US" sz="2800" i="1" dirty="0">
+              <a:rPr lang="en-US" sz="2700" i="1" dirty="0">
                 <a:solidFill>
                   <a:schemeClr val="tx1">
                     <a:lumMod val="85000"/>
@@ -3933,7 +4010,7 @@
               <a:t> International</a:t>
             </a:r>
             <a:r>
-              <a:rPr lang="en-US" sz="2800" dirty="0">
+              <a:rPr lang="en-US" sz="2700" dirty="0">
                 <a:solidFill>
                   <a:schemeClr val="tx1">
                     <a:lumMod val="85000"/>
@@ -3946,7 +4023,7 @@
               <a:t>, </a:t>
             </a:r>
             <a:r>
-              <a:rPr lang="en-US" sz="2800" i="1" dirty="0">
+              <a:rPr lang="en-US" sz="2700" i="1" dirty="0">
                 <a:solidFill>
                   <a:schemeClr val="tx1">
                     <a:lumMod val="85000"/>
@@ -3959,7 +4036,7 @@
               <a:t>5</a:t>
             </a:r>
             <a:r>
-              <a:rPr lang="en-US" sz="2800" dirty="0">
+              <a:rPr lang="en-US" sz="2700" dirty="0">
                 <a:solidFill>
                   <a:schemeClr val="tx1">
                     <a:lumMod val="85000"/>
@@ -3974,7 +4051,7 @@
           </a:p>
           <a:p>
             <a:r>
-              <a:rPr lang="en-US" sz="2800" dirty="0">
+              <a:rPr lang="en-US" sz="2700" dirty="0">
                 <a:solidFill>
                   <a:schemeClr val="tx1">
                     <a:lumMod val="85000"/>
@@ -3984,10 +4061,10 @@
                 <a:latin typeface="Amasis MT Pro" panose="02040504050005020304" pitchFamily="18" charset="0"/>
                 <a:cs typeface="Angsana New" panose="02020603050405020304" pitchFamily="18" charset="-34"/>
               </a:rPr>
-              <a:t>Cummings, S. N. &amp; Theodore, R. M. (in press). Perceptual learning of multiple talkers: Detriments, characteristics, and limitations. </a:t>
-            </a:r>
-            <a:r>
-              <a:rPr lang="en-US" sz="2800" i="1" dirty="0">
+              <a:t>Cummings, S. N. &amp; Theodore, R. M. (2022). Perceptual learning of multiple talkers: Detriments, characteristics, and limitations. </a:t>
+            </a:r>
+            <a:r>
+              <a:rPr lang="en-US" sz="2700" i="1" dirty="0">
                 <a:solidFill>
                   <a:schemeClr val="tx1">
                     <a:lumMod val="85000"/>
@@ -3997,12 +4074,12 @@
                 <a:latin typeface="Amasis MT Pro" panose="02040504050005020304" pitchFamily="18" charset="0"/>
                 <a:cs typeface="Angsana New" panose="02020603050405020304" pitchFamily="18" charset="-34"/>
               </a:rPr>
-              <a:t>Attention, </a:t>
-            </a:r>
-          </a:p>
-          <a:p>
-            <a:r>
-              <a:rPr lang="en-US" sz="2800" i="1" dirty="0">
+              <a:t>Attention, Perception, &amp; Psychophysics.</a:t>
+            </a:r>
+          </a:p>
+          <a:p>
+            <a:r>
+              <a:rPr lang="en-US" sz="2700" dirty="0" err="1">
                 <a:solidFill>
                   <a:schemeClr val="tx1">
                     <a:lumMod val="85000"/>
@@ -4012,12 +4089,10 @@
                 <a:latin typeface="Amasis MT Pro" panose="02040504050005020304" pitchFamily="18" charset="0"/>
                 <a:cs typeface="Angsana New" panose="02020603050405020304" pitchFamily="18" charset="-34"/>
               </a:rPr>
-              <a:t>	Perception, &amp; Psychophysics.</a:t>
-            </a:r>
-          </a:p>
-          <a:p>
-            <a:r>
-              <a:rPr lang="en-US" sz="2800" dirty="0" err="1">
+              <a:t>Kraljic</a:t>
+            </a:r>
+            <a:r>
+              <a:rPr lang="en-US" sz="2700" dirty="0">
                 <a:solidFill>
                   <a:schemeClr val="tx1">
                     <a:lumMod val="85000"/>
@@ -4027,10 +4102,10 @@
                 <a:latin typeface="Amasis MT Pro" panose="02040504050005020304" pitchFamily="18" charset="0"/>
                 <a:cs typeface="Angsana New" panose="02020603050405020304" pitchFamily="18" charset="-34"/>
               </a:rPr>
-              <a:t>Kraljic</a:t>
-            </a:r>
-            <a:r>
-              <a:rPr lang="en-US" sz="2800" dirty="0">
+              <a:t>, T., &amp; Samuel, A. G. (2005). Perceptual learning for speech: Is there a return to normal?. </a:t>
+            </a:r>
+            <a:r>
+              <a:rPr lang="en-US" sz="2700" i="1" dirty="0">
                 <a:solidFill>
                   <a:schemeClr val="tx1">
                     <a:lumMod val="85000"/>
@@ -4040,10 +4115,10 @@
                 <a:latin typeface="Amasis MT Pro" panose="02040504050005020304" pitchFamily="18" charset="0"/>
                 <a:cs typeface="Angsana New" panose="02020603050405020304" pitchFamily="18" charset="-34"/>
               </a:rPr>
-              <a:t>, T., &amp; Samuel, A. G. (2005). Perceptual learning for speech: Is there a return to normal?. </a:t>
-            </a:r>
-            <a:r>
-              <a:rPr lang="en-US" sz="2800" i="1" dirty="0">
+              <a:t>Cognitive psychology</a:t>
+            </a:r>
+            <a:r>
+              <a:rPr lang="en-US" sz="2700" dirty="0">
                 <a:solidFill>
                   <a:schemeClr val="tx1">
                     <a:lumMod val="85000"/>
@@ -4053,10 +4128,10 @@
                 <a:latin typeface="Amasis MT Pro" panose="02040504050005020304" pitchFamily="18" charset="0"/>
                 <a:cs typeface="Angsana New" panose="02020603050405020304" pitchFamily="18" charset="-34"/>
               </a:rPr>
-              <a:t>Cognitive psychology</a:t>
-            </a:r>
-            <a:r>
-              <a:rPr lang="en-US" sz="2800" dirty="0">
+              <a:t>, </a:t>
+            </a:r>
+            <a:r>
+              <a:rPr lang="en-US" sz="2700" i="1" dirty="0">
                 <a:solidFill>
                   <a:schemeClr val="tx1">
                     <a:lumMod val="85000"/>
@@ -4066,10 +4141,90 @@
                 <a:latin typeface="Amasis MT Pro" panose="02040504050005020304" pitchFamily="18" charset="0"/>
                 <a:cs typeface="Angsana New" panose="02020603050405020304" pitchFamily="18" charset="-34"/>
               </a:rPr>
+              <a:t>51</a:t>
+            </a:r>
+            <a:r>
+              <a:rPr lang="en-US" sz="2700" dirty="0">
+                <a:solidFill>
+                  <a:schemeClr val="tx1">
+                    <a:lumMod val="85000"/>
+                    <a:lumOff val="15000"/>
+                  </a:schemeClr>
+                </a:solidFill>
+                <a:latin typeface="Amasis MT Pro" panose="02040504050005020304" pitchFamily="18" charset="0"/>
+                <a:cs typeface="Angsana New" panose="02020603050405020304" pitchFamily="18" charset="-34"/>
+              </a:rPr>
+              <a:t>(2), 141-178. </a:t>
+            </a:r>
+          </a:p>
+          <a:p>
+            <a:r>
+              <a:rPr lang="en-US" sz="2700" dirty="0">
+                <a:solidFill>
+                  <a:schemeClr val="tx1">
+                    <a:lumMod val="85000"/>
+                    <a:lumOff val="15000"/>
+                  </a:schemeClr>
+                </a:solidFill>
+                <a:latin typeface="Amasis MT Pro" panose="02040504050005020304" pitchFamily="18" charset="0"/>
+                <a:cs typeface="Angsana New" panose="02020603050405020304" pitchFamily="18" charset="-34"/>
+              </a:rPr>
+              <a:t>Luthra, S., </a:t>
+            </a:r>
+            <a:r>
+              <a:rPr lang="en-US" sz="2700" dirty="0" err="1">
+                <a:solidFill>
+                  <a:schemeClr val="tx1">
+                    <a:lumMod val="85000"/>
+                    <a:lumOff val="15000"/>
+                  </a:schemeClr>
+                </a:solidFill>
+                <a:latin typeface="Amasis MT Pro" panose="02040504050005020304" pitchFamily="18" charset="0"/>
+                <a:cs typeface="Angsana New" panose="02020603050405020304" pitchFamily="18" charset="-34"/>
+              </a:rPr>
+              <a:t>Mechtenberg</a:t>
+            </a:r>
+            <a:r>
+              <a:rPr lang="en-US" sz="2700" dirty="0">
+                <a:solidFill>
+                  <a:schemeClr val="tx1">
+                    <a:lumMod val="85000"/>
+                    <a:lumOff val="15000"/>
+                  </a:schemeClr>
+                </a:solidFill>
+                <a:latin typeface="Amasis MT Pro" panose="02040504050005020304" pitchFamily="18" charset="0"/>
+                <a:cs typeface="Angsana New" panose="02020603050405020304" pitchFamily="18" charset="-34"/>
+              </a:rPr>
+              <a:t>, H., &amp; Myers, E. B. (2021). Perceptual learning of multiple talkers requires additional exposure</a:t>
+            </a:r>
+            <a:r>
+              <a:rPr lang="en-US" sz="2700" i="1" dirty="0">
+                <a:solidFill>
+                  <a:schemeClr val="tx1">
+                    <a:lumMod val="85000"/>
+                    <a:lumOff val="15000"/>
+                  </a:schemeClr>
+                </a:solidFill>
+                <a:latin typeface="Amasis MT Pro" panose="02040504050005020304" pitchFamily="18" charset="0"/>
+                <a:cs typeface="Angsana New" panose="02020603050405020304" pitchFamily="18" charset="-34"/>
+              </a:rPr>
+              <a:t>. Attention, Perception, &amp; Psychophysics</a:t>
+            </a:r>
+            <a:r>
+              <a:rPr lang="en-US" sz="2700" dirty="0">
+                <a:solidFill>
+                  <a:schemeClr val="tx1">
+                    <a:lumMod val="85000"/>
+                    <a:lumOff val="15000"/>
+                  </a:schemeClr>
+                </a:solidFill>
+                <a:latin typeface="Amasis MT Pro" panose="02040504050005020304" pitchFamily="18" charset="0"/>
+                <a:cs typeface="Angsana New" panose="02020603050405020304" pitchFamily="18" charset="-34"/>
+              </a:rPr>
               <a:t>, </a:t>
             </a:r>
             <a:r>
-              <a:rPr lang="en-US" sz="2800" i="1" dirty="0">
+              <a:rPr lang="en-US" sz="2700" i="1" dirty="0">
                 <a:solidFill>
                   <a:schemeClr val="tx1">
                     <a:lumMod val="85000"/>
@@ -4079,10 +4234,10 @@
                 <a:latin typeface="Amasis MT Pro" panose="02040504050005020304" pitchFamily="18" charset="0"/>
                 <a:cs typeface="Angsana New" panose="02020603050405020304" pitchFamily="18" charset="-34"/>
               </a:rPr>
-              <a:t>51</a:t>
-            </a:r>
-            <a:r>
-              <a:rPr lang="en-US" sz="2800" dirty="0">
+              <a:t>83</a:t>
+            </a:r>
+            <a:r>
+              <a:rPr lang="en-US" sz="2700" dirty="0">
                 <a:solidFill>
                   <a:schemeClr val="tx1">
                     <a:lumMod val="85000"/>
@@ -4092,12 +4247,12 @@
                 <a:latin typeface="Amasis MT Pro" panose="02040504050005020304" pitchFamily="18" charset="0"/>
                 <a:cs typeface="Angsana New" panose="02020603050405020304" pitchFamily="18" charset="-34"/>
               </a:rPr>
-              <a:t>(2), 141-178. </a:t>
-            </a:r>
-          </a:p>
-          <a:p>
-            <a:r>
-              <a:rPr lang="en-US" sz="2800" dirty="0">
+              <a:t>, 2217–2228.</a:t>
+            </a:r>
+          </a:p>
+          <a:p>
+            <a:r>
+              <a:rPr lang="en-US" sz="2700" dirty="0">
                 <a:solidFill>
                   <a:schemeClr val="tx1">
                     <a:lumMod val="85000"/>
@@ -4107,10 +4262,10 @@
                 <a:latin typeface="Amasis MT Pro" panose="02040504050005020304" pitchFamily="18" charset="0"/>
                 <a:cs typeface="Angsana New" panose="02020603050405020304" pitchFamily="18" charset="-34"/>
               </a:rPr>
-              <a:t>Luthra, S., </a:t>
-            </a:r>
-            <a:r>
-              <a:rPr lang="en-US" sz="2800" dirty="0" err="1">
+              <a:t>Tzeng, C. Y., Nygaard, L. C., &amp; Theodore, R. M. (2021). A second chance for a first impression: Sensitivity to cumulative input statistics for lexically guided perceptual learning. </a:t>
+            </a:r>
+            <a:r>
+              <a:rPr lang="en-US" sz="2700" i="1" dirty="0">
                 <a:solidFill>
                   <a:schemeClr val="tx1">
                     <a:lumMod val="85000"/>
@@ -4120,133 +4275,10 @@
                 <a:latin typeface="Amasis MT Pro" panose="02040504050005020304" pitchFamily="18" charset="0"/>
                 <a:cs typeface="Angsana New" panose="02020603050405020304" pitchFamily="18" charset="-34"/>
               </a:rPr>
-              <a:t>Mechtenberg</a:t>
-            </a:r>
-            <a:r>
-              <a:rPr lang="en-US" sz="2800" dirty="0">
-                <a:solidFill>
-                  <a:schemeClr val="tx1">
-                    <a:lumMod val="85000"/>
-                    <a:lumOff val="15000"/>
-                  </a:schemeClr>
-                </a:solidFill>
-                <a:latin typeface="Amasis MT Pro" panose="02040504050005020304" pitchFamily="18" charset="0"/>
-                <a:cs typeface="Angsana New" panose="02020603050405020304" pitchFamily="18" charset="-34"/>
-              </a:rPr>
-              <a:t>, H., &amp; Myers, E. B. (2021). Perceptual learning of multiple talkers requires additional exposure</a:t>
-            </a:r>
-            <a:r>
-              <a:rPr lang="en-US" sz="2800" i="1" dirty="0">
-                <a:solidFill>
-                  <a:schemeClr val="tx1">
-                    <a:lumMod val="85000"/>
-                    <a:lumOff val="15000"/>
-                  </a:schemeClr>
-                </a:solidFill>
-                <a:latin typeface="Amasis MT Pro" panose="02040504050005020304" pitchFamily="18" charset="0"/>
-                <a:cs typeface="Angsana New" panose="02020603050405020304" pitchFamily="18" charset="-34"/>
-              </a:rPr>
-              <a:t>. Attention, Perception, </a:t>
-            </a:r>
-          </a:p>
-          <a:p>
-            <a:r>
-              <a:rPr lang="en-US" sz="2800" i="1" dirty="0">
-                <a:solidFill>
-                  <a:schemeClr val="tx1">
-                    <a:lumMod val="85000"/>
-                    <a:lumOff val="15000"/>
-                  </a:schemeClr>
-                </a:solidFill>
-                <a:latin typeface="Amasis MT Pro" panose="02040504050005020304" pitchFamily="18" charset="0"/>
-                <a:cs typeface="Angsana New" panose="02020603050405020304" pitchFamily="18" charset="-34"/>
-              </a:rPr>
-              <a:t>	&amp; Psychophysics</a:t>
-            </a:r>
-            <a:r>
-              <a:rPr lang="en-US" sz="2800" dirty="0">
-                <a:solidFill>
-                  <a:schemeClr val="tx1">
-                    <a:lumMod val="85000"/>
-                    <a:lumOff val="15000"/>
-                  </a:schemeClr>
-                </a:solidFill>
-                <a:latin typeface="Amasis MT Pro" panose="02040504050005020304" pitchFamily="18" charset="0"/>
-                <a:cs typeface="Angsana New" panose="02020603050405020304" pitchFamily="18" charset="-34"/>
-              </a:rPr>
-              <a:t>, </a:t>
-            </a:r>
-            <a:r>
-              <a:rPr lang="en-US" sz="2800" i="1" dirty="0">
-                <a:solidFill>
-                  <a:schemeClr val="tx1">
-                    <a:lumMod val="85000"/>
-                    <a:lumOff val="15000"/>
-                  </a:schemeClr>
-                </a:solidFill>
-                <a:latin typeface="Amasis MT Pro" panose="02040504050005020304" pitchFamily="18" charset="0"/>
-                <a:cs typeface="Angsana New" panose="02020603050405020304" pitchFamily="18" charset="-34"/>
-              </a:rPr>
-              <a:t>83</a:t>
-            </a:r>
-            <a:r>
-              <a:rPr lang="en-US" sz="2800" dirty="0">
-                <a:solidFill>
-                  <a:schemeClr val="tx1">
-                    <a:lumMod val="85000"/>
-                    <a:lumOff val="15000"/>
-                  </a:schemeClr>
-                </a:solidFill>
-                <a:latin typeface="Amasis MT Pro" panose="02040504050005020304" pitchFamily="18" charset="0"/>
-                <a:cs typeface="Angsana New" panose="02020603050405020304" pitchFamily="18" charset="-34"/>
-              </a:rPr>
-              <a:t>, 2217–2228.</a:t>
-            </a:r>
-          </a:p>
-          <a:p>
-            <a:r>
-              <a:rPr lang="en-US" sz="2800" dirty="0">
-                <a:solidFill>
-                  <a:schemeClr val="tx1">
-                    <a:lumMod val="85000"/>
-                    <a:lumOff val="15000"/>
-                  </a:schemeClr>
-                </a:solidFill>
-                <a:latin typeface="Amasis MT Pro" panose="02040504050005020304" pitchFamily="18" charset="0"/>
-                <a:cs typeface="Angsana New" panose="02020603050405020304" pitchFamily="18" charset="-34"/>
-              </a:rPr>
-              <a:t>Tzeng, C. Y., Nygaard, L. C., &amp; Theodore, R. M. (2021). A second chance for a first impression: Sensitivity to cumulative input statistics for </a:t>
-            </a:r>
-          </a:p>
-          <a:p>
-            <a:r>
-              <a:rPr lang="en-US" sz="2800" dirty="0">
-                <a:solidFill>
-                  <a:schemeClr val="tx1">
-                    <a:lumMod val="85000"/>
-                    <a:lumOff val="15000"/>
-                  </a:schemeClr>
-                </a:solidFill>
-                <a:latin typeface="Amasis MT Pro" panose="02040504050005020304" pitchFamily="18" charset="0"/>
-                <a:cs typeface="Angsana New" panose="02020603050405020304" pitchFamily="18" charset="-34"/>
-              </a:rPr>
-              <a:t>	lexically guided perceptual learning. </a:t>
-            </a:r>
-            <a:r>
-              <a:rPr lang="en-US" sz="2800" i="1" dirty="0">
-                <a:solidFill>
-                  <a:schemeClr val="tx1">
-                    <a:lumMod val="85000"/>
-                    <a:lumOff val="15000"/>
-                  </a:schemeClr>
-                </a:solidFill>
-                <a:latin typeface="Amasis MT Pro" panose="02040504050005020304" pitchFamily="18" charset="0"/>
-                <a:cs typeface="Angsana New" panose="02020603050405020304" pitchFamily="18" charset="-34"/>
-              </a:rPr>
               <a:t>Psychonomic Bulletin &amp; Review, 28</a:t>
             </a:r>
             <a:r>
-              <a:rPr lang="en-US" sz="2800" dirty="0">
+              <a:rPr lang="en-US" sz="2700" dirty="0">
                 <a:solidFill>
                   <a:schemeClr val="tx1">
                     <a:lumMod val="85000"/>
@@ -4275,8 +4307,8 @@
         </p:nvSpPr>
         <p:spPr>
           <a:xfrm>
-            <a:off x="16939400" y="10233363"/>
-            <a:ext cx="11715869" cy="1754326"/>
+            <a:off x="16979046" y="9788427"/>
+            <a:ext cx="11718810" cy="1754326"/>
           </a:xfrm>
           <a:prstGeom prst="rect">
             <a:avLst/>
@@ -4420,8 +4452,8 @@
         </p:nvSpPr>
         <p:spPr>
           <a:xfrm>
-            <a:off x="17001783" y="12247243"/>
-            <a:ext cx="11653486" cy="1754326"/>
+            <a:off x="16979046" y="11717703"/>
+            <a:ext cx="11718810" cy="1754326"/>
           </a:xfrm>
           <a:prstGeom prst="rect">
             <a:avLst/>
@@ -4543,7 +4575,7 @@
         </p:blipFill>
         <p:spPr>
           <a:xfrm>
-            <a:off x="44817198" y="814380"/>
+            <a:off x="44738519" y="614395"/>
             <a:ext cx="3418112" cy="3147615"/>
           </a:xfrm>
           <a:prstGeom prst="rect">
@@ -4565,10 +4597,10 @@
         </p:nvGrpSpPr>
         <p:grpSpPr>
           <a:xfrm>
-            <a:off x="28883081" y="18429578"/>
-            <a:ext cx="11736170" cy="830997"/>
-            <a:chOff x="21012693" y="5544601"/>
-            <a:chExt cx="10068087" cy="830997"/>
+            <a:off x="28987930" y="17952611"/>
+            <a:ext cx="12218585" cy="830997"/>
+            <a:chOff x="21061830" y="5544601"/>
+            <a:chExt cx="10481936" cy="830997"/>
           </a:xfrm>
         </p:grpSpPr>
         <p:sp>
@@ -4585,8 +4617,8 @@
           </p:nvSpPr>
           <p:spPr>
             <a:xfrm>
-              <a:off x="21012693" y="5544601"/>
-              <a:ext cx="4223658" cy="830997"/>
+              <a:off x="21061830" y="5544601"/>
+              <a:ext cx="4174520" cy="830997"/>
             </a:xfrm>
             <a:prstGeom prst="rect">
               <a:avLst/>
@@ -4625,7 +4657,7 @@
           <p:spPr>
             <a:xfrm>
               <a:off x="23664237" y="5969865"/>
-              <a:ext cx="7416543" cy="26462"/>
+              <a:ext cx="7879529" cy="23675"/>
             </a:xfrm>
             <a:prstGeom prst="line">
               <a:avLst/>
@@ -4666,7 +4698,7 @@
         </p:nvSpPr>
         <p:spPr>
           <a:xfrm>
-            <a:off x="29194377" y="19368037"/>
+            <a:off x="29147404" y="18663371"/>
             <a:ext cx="12054127" cy="2862322"/>
           </a:xfrm>
           <a:prstGeom prst="rect">
@@ -4738,8 +4770,8 @@
         </p:blipFill>
         <p:spPr>
           <a:xfrm>
-            <a:off x="41248504" y="12190647"/>
-            <a:ext cx="7384264" cy="12248247"/>
+            <a:off x="41452435" y="11559804"/>
+            <a:ext cx="6572167" cy="11593595"/>
           </a:xfrm>
           <a:prstGeom prst="rect">
             <a:avLst/>
@@ -4760,7 +4792,7 @@
         </p:nvSpPr>
         <p:spPr>
           <a:xfrm>
-            <a:off x="28940359" y="15108875"/>
+            <a:off x="28987930" y="14703943"/>
             <a:ext cx="4771955" cy="830997"/>
           </a:xfrm>
           <a:prstGeom prst="rect">
@@ -4799,8 +4831,8 @@
         </p:nvCxnSpPr>
         <p:spPr>
           <a:xfrm>
-            <a:off x="32548626" y="15524373"/>
-            <a:ext cx="8221344" cy="0"/>
+            <a:off x="32596197" y="15119441"/>
+            <a:ext cx="8610317" cy="0"/>
           </a:xfrm>
           <a:prstGeom prst="line">
             <a:avLst/>
@@ -4840,8 +4872,8 @@
         </p:nvSpPr>
         <p:spPr>
           <a:xfrm>
-            <a:off x="1105495" y="27369016"/>
-            <a:ext cx="14752658" cy="928908"/>
+            <a:off x="872708" y="27816791"/>
+            <a:ext cx="15335182" cy="752583"/>
           </a:xfrm>
           <a:prstGeom prst="roundRect">
             <a:avLst/>
@@ -4895,12 +4927,64 @@
           </a:p>
         </p:txBody>
       </p:sp>
+      <p:sp>
+        <p:nvSpPr>
+          <p:cNvPr id="27" name="TextBox 26">
+            <a:extLst>
+              <a:ext uri="{FF2B5EF4-FFF2-40B4-BE49-F238E27FC236}">
+                <a16:creationId xmlns:a16="http://schemas.microsoft.com/office/drawing/2014/main" id="{382DF8D0-7769-2EB8-E80E-77206AFB4394}"/>
+              </a:ext>
+            </a:extLst>
+          </p:cNvPr>
+          <p:cNvSpPr txBox="1"/>
+          <p:nvPr/>
+        </p:nvSpPr>
+        <p:spPr>
+          <a:xfrm>
+            <a:off x="29147403" y="11669871"/>
+            <a:ext cx="12621864" cy="2862322"/>
+          </a:xfrm>
+          <a:prstGeom prst="rect">
+            <a:avLst/>
+          </a:prstGeom>
+          <a:noFill/>
+        </p:spPr>
+        <p:txBody>
+          <a:bodyPr wrap="square" rtlCol="0">
+            <a:spAutoFit/>
+          </a:bodyPr>
+          <a:lstStyle/>
+          <a:p>
+            <a:r>
+              <a:rPr lang="en-US" sz="3600" dirty="0">
+                <a:latin typeface="Amasis MT Pro" panose="02040504050005020304" pitchFamily="18" charset="0"/>
+              </a:rPr>
+              <a:t>The word pairings shown horizontally across in Materials A &amp; B were then spliced together to </a:t>
+            </a:r>
+            <a:r>
+              <a:rPr lang="en-US" sz="3600" b="1" dirty="0">
+                <a:solidFill>
+                  <a:srgbClr val="4D7000"/>
+                </a:solidFill>
+                <a:latin typeface="Amasis MT Pro" panose="02040504050005020304" pitchFamily="18" charset="0"/>
+              </a:rPr>
+              <a:t>create stereo audio files </a:t>
+            </a:r>
+            <a:r>
+              <a:rPr lang="en-US" sz="3600" dirty="0">
+                <a:latin typeface="Amasis MT Pro" panose="02040504050005020304" pitchFamily="18" charset="0"/>
+              </a:rPr>
+              <a:t>where one talker is played in the left ear, and the other in the right ear. Like talker gender, ear assignment was counterbalanced across participants.</a:t>
+            </a:r>
+          </a:p>
+        </p:txBody>
+      </p:sp>
       <p:pic>
         <p:nvPicPr>
-          <p:cNvPr id="57" name="Picture 56">
+          <p:cNvPr id="97" name="Picture 96">
             <a:extLst>
               <a:ext uri="{FF2B5EF4-FFF2-40B4-BE49-F238E27FC236}">
-                <a16:creationId xmlns:a16="http://schemas.microsoft.com/office/drawing/2014/main" id="{25BF7B2D-470A-E542-A103-B93023CCA5E1}"/>
+                <a16:creationId xmlns:a16="http://schemas.microsoft.com/office/drawing/2014/main" id="{07E09074-0FFD-841E-0A53-6368DCC15AF9}"/>
               </a:ext>
             </a:extLst>
           </p:cNvPr>
@@ -4917,119 +5001,7 @@
         </p:blipFill>
         <p:spPr>
           <a:xfrm>
-            <a:off x="1466551" y="13437851"/>
-            <a:ext cx="13890397" cy="7174659"/>
-          </a:xfrm>
-          <a:prstGeom prst="rect">
-            <a:avLst/>
-          </a:prstGeom>
-        </p:spPr>
-      </p:pic>
-      <p:pic>
-        <p:nvPicPr>
-          <p:cNvPr id="58" name="Picture 57">
-            <a:extLst>
-              <a:ext uri="{FF2B5EF4-FFF2-40B4-BE49-F238E27FC236}">
-                <a16:creationId xmlns:a16="http://schemas.microsoft.com/office/drawing/2014/main" id="{0192DD06-EF87-1638-D6CE-38CA4FDEBA68}"/>
-              </a:ext>
-            </a:extLst>
-          </p:cNvPr>
-          <p:cNvPicPr>
-            <a:picLocks noChangeAspect="1"/>
-          </p:cNvPicPr>
-          <p:nvPr/>
-        </p:nvPicPr>
-        <p:blipFill>
-          <a:blip r:embed="rId5"/>
-          <a:stretch>
-            <a:fillRect/>
-          </a:stretch>
-        </p:blipFill>
-        <p:spPr>
-          <a:xfrm>
-            <a:off x="1318330" y="20189238"/>
-            <a:ext cx="14038618" cy="7132762"/>
-          </a:xfrm>
-          <a:prstGeom prst="rect">
-            <a:avLst/>
-          </a:prstGeom>
-        </p:spPr>
-      </p:pic>
-      <p:sp>
-        <p:nvSpPr>
-          <p:cNvPr id="27" name="TextBox 26">
-            <a:extLst>
-              <a:ext uri="{FF2B5EF4-FFF2-40B4-BE49-F238E27FC236}">
-                <a16:creationId xmlns:a16="http://schemas.microsoft.com/office/drawing/2014/main" id="{382DF8D0-7769-2EB8-E80E-77206AFB4394}"/>
-              </a:ext>
-            </a:extLst>
-          </p:cNvPr>
-          <p:cNvSpPr txBox="1"/>
-          <p:nvPr/>
-        </p:nvSpPr>
-        <p:spPr>
-          <a:xfrm>
-            <a:off x="29184386" y="11955747"/>
-            <a:ext cx="12621864" cy="2862322"/>
-          </a:xfrm>
-          <a:prstGeom prst="rect">
-            <a:avLst/>
-          </a:prstGeom>
-          <a:noFill/>
-        </p:spPr>
-        <p:txBody>
-          <a:bodyPr wrap="square" rtlCol="0">
-            <a:spAutoFit/>
-          </a:bodyPr>
-          <a:lstStyle/>
-          <a:p>
-            <a:r>
-              <a:rPr lang="en-US" sz="3600" dirty="0">
-                <a:latin typeface="Amasis MT Pro" panose="02040504050005020304" pitchFamily="18" charset="0"/>
-              </a:rPr>
-              <a:t>The word pairings shown horizontally across in Materials A &amp; B were then spliced together to </a:t>
-            </a:r>
-            <a:r>
-              <a:rPr lang="en-US" sz="3600" b="1" dirty="0">
-                <a:solidFill>
-                  <a:srgbClr val="4D7000"/>
-                </a:solidFill>
-                <a:latin typeface="Amasis MT Pro" panose="02040504050005020304" pitchFamily="18" charset="0"/>
-              </a:rPr>
-              <a:t>create stereo audio files </a:t>
-            </a:r>
-            <a:r>
-              <a:rPr lang="en-US" sz="3600" dirty="0">
-                <a:latin typeface="Amasis MT Pro" panose="02040504050005020304" pitchFamily="18" charset="0"/>
-              </a:rPr>
-              <a:t>where one talker is played in the left ear, and the other in the right ear. Like talker gender, ear assignment was counterbalanced across participants.</a:t>
-            </a:r>
-          </a:p>
-        </p:txBody>
-      </p:sp>
-      <p:pic>
-        <p:nvPicPr>
-          <p:cNvPr id="97" name="Picture 96">
-            <a:extLst>
-              <a:ext uri="{FF2B5EF4-FFF2-40B4-BE49-F238E27FC236}">
-                <a16:creationId xmlns:a16="http://schemas.microsoft.com/office/drawing/2014/main" id="{07E09074-0FFD-841E-0A53-6368DCC15AF9}"/>
-              </a:ext>
-            </a:extLst>
-          </p:cNvPr>
-          <p:cNvPicPr>
-            <a:picLocks noChangeAspect="1"/>
-          </p:cNvPicPr>
-          <p:nvPr/>
-        </p:nvPicPr>
-        <p:blipFill>
-          <a:blip r:embed="rId6"/>
-          <a:stretch>
-            <a:fillRect/>
-          </a:stretch>
-        </p:blipFill>
-        <p:spPr>
-          <a:xfrm>
-            <a:off x="22501765" y="15978850"/>
+            <a:off x="22556548" y="15421391"/>
             <a:ext cx="5101113" cy="6483959"/>
           </a:xfrm>
           <a:prstGeom prst="rect">
@@ -5052,14 +5024,14 @@
           <p:nvPr/>
         </p:nvPicPr>
         <p:blipFill>
-          <a:blip r:embed="rId7"/>
+          <a:blip r:embed="rId5"/>
           <a:stretch>
             <a:fillRect/>
           </a:stretch>
         </p:blipFill>
         <p:spPr>
           <a:xfrm>
-            <a:off x="17433987" y="16130686"/>
+            <a:off x="17488770" y="15573227"/>
             <a:ext cx="5101113" cy="6268062"/>
           </a:xfrm>
           <a:prstGeom prst="rect">
@@ -5081,8 +5053,8 @@
         </p:nvSpPr>
         <p:spPr>
           <a:xfrm>
-            <a:off x="17025257" y="14261123"/>
-            <a:ext cx="11632952" cy="1754326"/>
+            <a:off x="16957632" y="13643951"/>
+            <a:ext cx="11718810" cy="1754326"/>
           </a:xfrm>
           <a:prstGeom prst="rect">
             <a:avLst/>
@@ -5126,7 +5098,7 @@
                 </a:solidFill>
                 <a:latin typeface="Amasis MT Pro" panose="02040504050005020304" pitchFamily="18" charset="0"/>
               </a:rPr>
-              <a:t>: </a:t>
+              <a:t>:</a:t>
             </a:r>
             <a:r>
               <a:rPr lang="en-US" sz="3600" dirty="0">
@@ -5167,8 +5139,8 @@
         </p:nvSpPr>
         <p:spPr>
           <a:xfrm>
-            <a:off x="16710812" y="22475712"/>
-            <a:ext cx="11715869" cy="1754326"/>
+            <a:off x="16902377" y="22750109"/>
+            <a:ext cx="11490223" cy="1754326"/>
           </a:xfrm>
           <a:prstGeom prst="rect">
             <a:avLst/>
@@ -5253,7 +5225,7 @@
         </p:nvSpPr>
         <p:spPr>
           <a:xfrm>
-            <a:off x="29194377" y="9479848"/>
+            <a:off x="29147403" y="9283674"/>
             <a:ext cx="19051815" cy="2308324"/>
           </a:xfrm>
           <a:prstGeom prst="rect">
@@ -5330,9 +5302,9 @@
           <p:nvPr/>
         </p:nvCxnSpPr>
         <p:spPr>
-          <a:xfrm flipH="1" flipV="1">
-            <a:off x="28657132" y="9479848"/>
-            <a:ext cx="52776" cy="14508266"/>
+          <a:xfrm flipV="1">
+            <a:off x="28801894" y="9440615"/>
+            <a:ext cx="20019" cy="14362264"/>
           </a:xfrm>
           <a:prstGeom prst="line">
             <a:avLst/>
@@ -5372,8 +5344,8 @@
         </p:nvSpPr>
         <p:spPr>
           <a:xfrm>
-            <a:off x="29186248" y="16051273"/>
-            <a:ext cx="12239219" cy="2308324"/>
+            <a:off x="29117769" y="15470854"/>
+            <a:ext cx="12204772" cy="2308324"/>
           </a:xfrm>
           <a:prstGeom prst="rect">
             <a:avLst/>
@@ -5478,8 +5450,8 @@
         </p:nvSpPr>
         <p:spPr>
           <a:xfrm>
-            <a:off x="1142290" y="28306952"/>
-            <a:ext cx="14601541" cy="3600986"/>
+            <a:off x="855212" y="28569374"/>
+            <a:ext cx="15133276" cy="3600986"/>
           </a:xfrm>
           <a:prstGeom prst="rect">
             <a:avLst/>
@@ -5502,7 +5474,7 @@
                 </a:solidFill>
                 <a:latin typeface="Amasis MT Pro" panose="02040504050005020304" pitchFamily="18" charset="0"/>
               </a:rPr>
-              <a:t>The results of this experiment begin to explore the role of attention in speech perception adaptation. A listener’s perceptual boundary changing more to fit the attended talker’s speech than the unattended talker’s speech in this experiment would suggest a difference between passive and active attention in speech processing and give insight into how our brains allocates resources under higher cognitive loads.</a:t>
+              <a:t>The results of this experiment begin to explore the role of attention in speech perception adaptation. A listener’s perceptual boundary changing more to fit the attended talker’s speech than the unattended talker’s speech would suggest there are limits to the automaticity of speech perception and may also provide insight into how our brains allocate attentional resources under higher cognitive loads.</a:t>
             </a:r>
           </a:p>
         </p:txBody>
@@ -5523,8 +5495,8 @@
         </p:nvCxnSpPr>
         <p:spPr>
           <a:xfrm>
-            <a:off x="20757058" y="9791329"/>
-            <a:ext cx="7165033" cy="0"/>
+            <a:off x="21062212" y="9346393"/>
+            <a:ext cx="6902466" cy="0"/>
           </a:xfrm>
           <a:prstGeom prst="line">
             <a:avLst/>
@@ -5564,8 +5536,8 @@
         </p:nvSpPr>
         <p:spPr>
           <a:xfrm>
-            <a:off x="16711063" y="9386978"/>
-            <a:ext cx="4771955" cy="830997"/>
+            <a:off x="16981986" y="8930438"/>
+            <a:ext cx="4600813" cy="830997"/>
           </a:xfrm>
           <a:prstGeom prst="rect">
             <a:avLst/>
@@ -5601,10 +5573,10 @@
         </p:nvGrpSpPr>
         <p:grpSpPr>
           <a:xfrm>
-            <a:off x="16711063" y="8300430"/>
-            <a:ext cx="31445568" cy="830997"/>
-            <a:chOff x="16751289" y="8070830"/>
-            <a:chExt cx="31445568" cy="830997"/>
+            <a:off x="16895618" y="8300430"/>
+            <a:ext cx="31163652" cy="830997"/>
+            <a:chOff x="16707188" y="8070830"/>
+            <a:chExt cx="31391596" cy="830997"/>
           </a:xfrm>
         </p:grpSpPr>
         <p:sp>
@@ -5660,8 +5632,8 @@
           </p:nvCxnSpPr>
           <p:spPr>
             <a:xfrm>
-              <a:off x="16751289" y="8457284"/>
-              <a:ext cx="13126199" cy="71218"/>
+              <a:off x="16707188" y="8477982"/>
+              <a:ext cx="13170301" cy="50520"/>
             </a:xfrm>
             <a:prstGeom prst="line">
               <a:avLst/>
@@ -5703,8 +5675,8 @@
           </p:nvCxnSpPr>
           <p:spPr>
             <a:xfrm flipV="1">
-              <a:off x="35070658" y="8473305"/>
-              <a:ext cx="13126199" cy="62194"/>
+              <a:off x="35070658" y="8477982"/>
+              <a:ext cx="13028126" cy="57517"/>
             </a:xfrm>
             <a:prstGeom prst="line">
               <a:avLst/>
@@ -5745,10 +5717,10 @@
         </p:nvGrpSpPr>
         <p:grpSpPr>
           <a:xfrm>
-            <a:off x="16840042" y="24550294"/>
-            <a:ext cx="31445568" cy="830997"/>
-            <a:chOff x="16751289" y="8070830"/>
-            <a:chExt cx="31445568" cy="830997"/>
+            <a:off x="16895618" y="24371853"/>
+            <a:ext cx="31119033" cy="830997"/>
+            <a:chOff x="16869211" y="8092025"/>
+            <a:chExt cx="31119033" cy="830997"/>
           </a:xfrm>
         </p:grpSpPr>
         <p:sp>
@@ -5765,7 +5737,7 @@
           </p:nvSpPr>
           <p:spPr>
             <a:xfrm>
-              <a:off x="30223152" y="8070830"/>
+              <a:off x="30207360" y="8092025"/>
               <a:ext cx="4771954" cy="830997"/>
             </a:xfrm>
             <a:prstGeom prst="rect">
@@ -5805,8 +5777,8 @@
           </p:nvCxnSpPr>
           <p:spPr>
             <a:xfrm>
-              <a:off x="16751289" y="8457284"/>
-              <a:ext cx="13756060" cy="39789"/>
+              <a:off x="16869211" y="8543085"/>
+              <a:ext cx="13638138" cy="79919"/>
             </a:xfrm>
             <a:prstGeom prst="line">
               <a:avLst/>
@@ -5848,8 +5820,8 @@
           </p:nvCxnSpPr>
           <p:spPr>
             <a:xfrm flipV="1">
-              <a:off x="34449541" y="8473305"/>
-              <a:ext cx="13747316" cy="13023"/>
+              <a:off x="34696956" y="8568701"/>
+              <a:ext cx="13291288" cy="23675"/>
             </a:xfrm>
             <a:prstGeom prst="line">
               <a:avLst/>
@@ -5890,8 +5862,8 @@
         </p:nvSpPr>
         <p:spPr>
           <a:xfrm>
-            <a:off x="16893873" y="25459548"/>
-            <a:ext cx="24500700" cy="1754326"/>
+            <a:off x="16895618" y="25230341"/>
+            <a:ext cx="20497573" cy="2308324"/>
           </a:xfrm>
           <a:prstGeom prst="rect">
             <a:avLst/>
@@ -5904,7 +5876,6 @@
           </a:bodyPr>
           <a:lstStyle/>
           <a:p>
-            <a:pPr algn="ctr"/>
             <a:r>
               <a:rPr lang="en-US" sz="3600" dirty="0">
                 <a:solidFill>
@@ -5939,7 +5910,7 @@
                 </a:solidFill>
                 <a:latin typeface="Amasis MT Pro" panose="02040504050005020304" pitchFamily="18" charset="0"/>
               </a:rPr>
-              <a:t> test continuum across trials in both talkers’ voices. Each trial will only play a recording from a single voice at once. Participants will select if the audio they heard was “</a:t>
+              <a:t> test continuum across trials in each talker’s voice. This continuum is used to gauge when listener’s shift from perceiving a sound as “</a:t>
             </a:r>
             <a:r>
               <a:rPr lang="en-US" sz="3600" dirty="0" err="1">
@@ -5951,7 +5922,7 @@
                 </a:solidFill>
                 <a:latin typeface="Amasis MT Pro" panose="02040504050005020304" pitchFamily="18" charset="0"/>
               </a:rPr>
-              <a:t>asi</a:t>
+              <a:t>Sh</a:t>
             </a:r>
             <a:r>
               <a:rPr lang="en-US" sz="3600" dirty="0">
@@ -5963,19 +5934,19 @@
                 </a:solidFill>
                 <a:latin typeface="Amasis MT Pro" panose="02040504050005020304" pitchFamily="18" charset="0"/>
               </a:rPr>
-              <a:t>” or “</a:t>
-            </a:r>
-            <a:r>
-              <a:rPr lang="en-US" sz="3600" dirty="0" err="1">
-                <a:solidFill>
-                  <a:schemeClr val="tx1">
-                    <a:lumMod val="85000"/>
-                    <a:lumOff val="15000"/>
-                  </a:schemeClr>
-                </a:solidFill>
-                <a:latin typeface="Amasis MT Pro" panose="02040504050005020304" pitchFamily="18" charset="0"/>
-              </a:rPr>
-              <a:t>ashi</a:t>
+              <a:t>” to “S” (</a:t>
+            </a:r>
+            <a:r>
+              <a:rPr lang="en-US" sz="3600" i="1" dirty="0">
+                <a:solidFill>
+                  <a:schemeClr val="tx1">
+                    <a:lumMod val="85000"/>
+                    <a:lumOff val="15000"/>
+                  </a:schemeClr>
+                </a:solidFill>
+                <a:latin typeface="Amasis MT Pro" panose="02040504050005020304" pitchFamily="18" charset="0"/>
+              </a:rPr>
+              <a:t>see left</a:t>
             </a:r>
             <a:r>
               <a:rPr lang="en-US" sz="3600" dirty="0">
@@ -5987,31 +5958,7 @@
                 </a:solidFill>
                 <a:latin typeface="Amasis MT Pro" panose="02040504050005020304" pitchFamily="18" charset="0"/>
               </a:rPr>
-              <a:t>” (</a:t>
-            </a:r>
-            <a:r>
-              <a:rPr lang="en-US" sz="3600" i="1" dirty="0">
-                <a:solidFill>
-                  <a:schemeClr val="tx1">
-                    <a:lumMod val="85000"/>
-                    <a:lumOff val="15000"/>
-                  </a:schemeClr>
-                </a:solidFill>
-                <a:latin typeface="Amasis MT Pro" panose="02040504050005020304" pitchFamily="18" charset="0"/>
-              </a:rPr>
-              <a:t>see left</a:t>
-            </a:r>
-            <a:r>
-              <a:rPr lang="en-US" sz="3600" dirty="0">
-                <a:solidFill>
-                  <a:schemeClr val="tx1">
-                    <a:lumMod val="85000"/>
-                    <a:lumOff val="15000"/>
-                  </a:schemeClr>
-                </a:solidFill>
-                <a:latin typeface="Amasis MT Pro" panose="02040504050005020304" pitchFamily="18" charset="0"/>
-              </a:rPr>
-              <a:t>) for each trial, to produce results like the predictions, shown to the left. </a:t>
+              <a:t>). Each trial will only play a recording from a single voice at once. Participants will select if the audio they heard was “asi” or “ashi” for each trial, to produce results like the predictions, shown to the left. </a:t>
             </a:r>
           </a:p>
         </p:txBody>
@@ -6030,10 +5977,10 @@
         </p:nvGrpSpPr>
         <p:grpSpPr>
           <a:xfrm>
-            <a:off x="29837262" y="22358013"/>
-            <a:ext cx="10934901" cy="1689994"/>
-            <a:chOff x="29837262" y="22660851"/>
-            <a:chExt cx="10934901" cy="1689994"/>
+            <a:off x="29841703" y="21547886"/>
+            <a:ext cx="10165564" cy="1342061"/>
+            <a:chOff x="29966567" y="22271676"/>
+            <a:chExt cx="10805596" cy="1448145"/>
           </a:xfrm>
         </p:grpSpPr>
         <p:pic>
@@ -6051,7 +5998,7 @@
             <p:nvPr/>
           </p:nvPicPr>
           <p:blipFill rotWithShape="1">
-            <a:blip r:embed="rId8"/>
+            <a:blip r:embed="rId6"/>
             <a:srcRect t="14466" b="14022"/>
             <a:stretch/>
           </p:blipFill>
@@ -6080,7 +6027,7 @@
             <p:nvPr/>
           </p:nvPicPr>
           <p:blipFill>
-            <a:blip r:embed="rId9">
+            <a:blip r:embed="rId7">
               <a:duotone>
                 <a:schemeClr val="accent6">
                   <a:shade val="45000"/>
@@ -6091,7 +6038,7 @@
               <a:extLst>
                 <a:ext uri="{BEBA8EAE-BF5A-486C-A8C5-ECC9F3942E4B}">
                   <a14:imgProps xmlns:a14="http://schemas.microsoft.com/office/drawing/2010/main">
-                    <a14:imgLayer r:embed="rId10">
+                    <a14:imgLayer r:embed="rId8">
                       <a14:imgEffect>
                         <a14:backgroundRemoval t="10000" b="90000" l="10000" r="90000">
                           <a14:foregroundMark x1="32333" y1="46289" x2="42556" y2="49609"/>
@@ -6116,8 +6063,8 @@
           </p:blipFill>
           <p:spPr bwMode="auto">
             <a:xfrm>
-              <a:off x="29837262" y="22735854"/>
-              <a:ext cx="1597787" cy="908963"/>
+              <a:off x="29966567" y="22809415"/>
+              <a:ext cx="1468481" cy="835403"/>
             </a:xfrm>
             <a:prstGeom prst="rect">
               <a:avLst/>
@@ -6192,7 +6139,7 @@
           </p:nvSpPr>
           <p:spPr>
             <a:xfrm>
-              <a:off x="29983466" y="23700692"/>
+              <a:off x="30136122" y="22292756"/>
               <a:ext cx="1832584" cy="584775"/>
             </a:xfrm>
             <a:prstGeom prst="rect">
@@ -6207,7 +6154,7 @@
             <a:lstStyle/>
             <a:p>
               <a:r>
-                <a:rPr lang="en-US" sz="3200" dirty="0">
+                <a:rPr lang="en-US" sz="2800" dirty="0">
                   <a:solidFill>
                     <a:schemeClr val="tx1">
                       <a:lumMod val="85000"/>
@@ -6235,7 +6182,7 @@
           </p:nvSpPr>
           <p:spPr>
             <a:xfrm>
-              <a:off x="36664739" y="23766070"/>
+              <a:off x="36639875" y="22271676"/>
               <a:ext cx="1832584" cy="584775"/>
             </a:xfrm>
             <a:prstGeom prst="rect">
@@ -6250,7 +6197,7 @@
             <a:lstStyle/>
             <a:p>
               <a:r>
-                <a:rPr lang="en-US" sz="3200" dirty="0">
+                <a:rPr lang="en-US" sz="2800" dirty="0">
                   <a:solidFill>
                     <a:schemeClr val="tx1">
                       <a:lumMod val="85000"/>
@@ -6267,36 +6214,6 @@
       </p:grpSp>
       <p:pic>
         <p:nvPicPr>
-          <p:cNvPr id="52" name="Picture 51">
-            <a:extLst>
-              <a:ext uri="{FF2B5EF4-FFF2-40B4-BE49-F238E27FC236}">
-                <a16:creationId xmlns:a16="http://schemas.microsoft.com/office/drawing/2014/main" id="{2F217CCC-4A85-712D-8C08-0AD7217FD671}"/>
-              </a:ext>
-            </a:extLst>
-          </p:cNvPr>
-          <p:cNvPicPr>
-            <a:picLocks noChangeAspect="1"/>
-          </p:cNvPicPr>
-          <p:nvPr/>
-        </p:nvPicPr>
-        <p:blipFill>
-          <a:blip r:embed="rId11"/>
-          <a:stretch>
-            <a:fillRect/>
-          </a:stretch>
-        </p:blipFill>
-        <p:spPr>
-          <a:xfrm>
-            <a:off x="42036860" y="25368267"/>
-            <a:ext cx="5807551" cy="1589435"/>
-          </a:xfrm>
-          <a:prstGeom prst="rect">
-            <a:avLst/>
-          </a:prstGeom>
-        </p:spPr>
-      </p:pic>
-      <p:pic>
-        <p:nvPicPr>
           <p:cNvPr id="4" name="Picture 3" descr="A picture containing qr code&#10;&#10;Description automatically generated">
             <a:extLst>
               <a:ext uri="{FF2B5EF4-FFF2-40B4-BE49-F238E27FC236}">
@@ -6310,7 +6227,7 @@
           <p:nvPr/>
         </p:nvPicPr>
         <p:blipFill>
-          <a:blip r:embed="rId12">
+          <a:blip r:embed="rId9">
             <a:extLst>
               <a:ext uri="{28A0092B-C50C-407E-A947-70E740481C1C}">
                 <a14:useLocalDpi xmlns:a14="http://schemas.microsoft.com/office/drawing/2010/main" val="0"/>
@@ -6323,8 +6240,8 @@
         </p:blipFill>
         <p:spPr>
           <a:xfrm>
-            <a:off x="46355014" y="29887938"/>
-            <a:ext cx="2216082" cy="2216082"/>
+            <a:off x="45828284" y="29928782"/>
+            <a:ext cx="2422512" cy="2422512"/>
           </a:xfrm>
           <a:prstGeom prst="rect">
             <a:avLst/>
@@ -6345,8 +6262,8 @@
         </p:nvSpPr>
         <p:spPr>
           <a:xfrm>
-            <a:off x="39495534" y="27663249"/>
-            <a:ext cx="8878754" cy="854456"/>
+            <a:off x="37245282" y="27784908"/>
+            <a:ext cx="10953936" cy="811521"/>
           </a:xfrm>
           <a:prstGeom prst="roundRect">
             <a:avLst/>
@@ -6414,8 +6331,8 @@
         </p:nvSpPr>
         <p:spPr>
           <a:xfrm>
-            <a:off x="39642083" y="28517704"/>
-            <a:ext cx="8863385" cy="1569660"/>
+            <a:off x="37245282" y="30693032"/>
+            <a:ext cx="9081904" cy="1477328"/>
           </a:xfrm>
           <a:prstGeom prst="rect">
             <a:avLst/>
@@ -6429,7 +6346,7 @@
           <a:lstStyle/>
           <a:p>
             <a:r>
-              <a:rPr lang="en-US" sz="3200" dirty="0">
+              <a:rPr lang="en-US" sz="3000" dirty="0">
                 <a:solidFill>
                   <a:schemeClr val="tx1">
                     <a:lumMod val="85000"/>
@@ -6441,7 +6358,7 @@
               <a:t>This project was funded by the University of Rochester </a:t>
             </a:r>
             <a:r>
-              <a:rPr lang="en-US" sz="3200" dirty="0" err="1">
+              <a:rPr lang="en-US" sz="3000" dirty="0" err="1">
                 <a:solidFill>
                   <a:schemeClr val="tx1">
                     <a:lumMod val="85000"/>
@@ -6453,7 +6370,7 @@
               <a:t>Wiesman</a:t>
             </a:r>
             <a:r>
-              <a:rPr lang="en-US" sz="3200" dirty="0">
+              <a:rPr lang="en-US" sz="3000" dirty="0">
                 <a:solidFill>
                   <a:schemeClr val="tx1">
                     <a:lumMod val="85000"/>
@@ -6481,8 +6398,8 @@
         </p:nvSpPr>
         <p:spPr>
           <a:xfrm>
-            <a:off x="39648806" y="30087364"/>
-            <a:ext cx="6877892" cy="1938992"/>
+            <a:off x="37245282" y="28658679"/>
+            <a:ext cx="10970904" cy="2000548"/>
           </a:xfrm>
           <a:prstGeom prst="rect">
             <a:avLst/>
@@ -6496,16 +6413,64 @@
           <a:lstStyle/>
           <a:p>
             <a:r>
-              <a:rPr lang="en-US" sz="3000" dirty="0">
-                <a:solidFill>
-                  <a:schemeClr val="tx1">
-                    <a:lumMod val="85000"/>
-                    <a:lumOff val="15000"/>
-                  </a:schemeClr>
-                </a:solidFill>
-                <a:latin typeface="Amasis MT Pro" panose="02040504050005020304" pitchFamily="18" charset="0"/>
-              </a:rPr>
-              <a:t>Thank you to Dr. Jaeger and the HLP lab, the 2022 Meliora Mentors, and the University of Rochester Brain &amp; Cognitive sciences department.</a:t>
+              <a:rPr lang="en-US" sz="3100" dirty="0">
+                <a:solidFill>
+                  <a:schemeClr val="tx1">
+                    <a:lumMod val="85000"/>
+                    <a:lumOff val="15000"/>
+                  </a:schemeClr>
+                </a:solidFill>
+                <a:latin typeface="Amasis MT Pro" panose="02040504050005020304" pitchFamily="18" charset="0"/>
+              </a:rPr>
+              <a:t>Thank you to Dr. Tanya </a:t>
+            </a:r>
+            <a:r>
+              <a:rPr lang="en-US" sz="3100" dirty="0" err="1">
+                <a:solidFill>
+                  <a:schemeClr val="tx1">
+                    <a:lumMod val="85000"/>
+                    <a:lumOff val="15000"/>
+                  </a:schemeClr>
+                </a:solidFill>
+                <a:latin typeface="Amasis MT Pro" panose="02040504050005020304" pitchFamily="18" charset="0"/>
+              </a:rPr>
+              <a:t>Kraljic</a:t>
+            </a:r>
+            <a:r>
+              <a:rPr lang="en-US" sz="3100" dirty="0">
+                <a:solidFill>
+                  <a:schemeClr val="tx1">
+                    <a:lumMod val="85000"/>
+                    <a:lumOff val="15000"/>
+                  </a:schemeClr>
+                </a:solidFill>
+                <a:latin typeface="Amasis MT Pro" panose="02040504050005020304" pitchFamily="18" charset="0"/>
+              </a:rPr>
+              <a:t> and Dr. Arthur Samuel for permission to use the stimuli they had developed (</a:t>
+            </a:r>
+            <a:r>
+              <a:rPr lang="en-US" sz="3100" dirty="0" err="1">
+                <a:solidFill>
+                  <a:schemeClr val="tx1">
+                    <a:lumMod val="85000"/>
+                    <a:lumOff val="15000"/>
+                  </a:schemeClr>
+                </a:solidFill>
+                <a:latin typeface="Amasis MT Pro" panose="02040504050005020304" pitchFamily="18" charset="0"/>
+              </a:rPr>
+              <a:t>Kraljic</a:t>
+            </a:r>
+            <a:r>
+              <a:rPr lang="en-US" sz="3100" dirty="0">
+                <a:solidFill>
+                  <a:schemeClr val="tx1">
+                    <a:lumMod val="85000"/>
+                    <a:lumOff val="15000"/>
+                  </a:schemeClr>
+                </a:solidFill>
+                <a:latin typeface="Amasis MT Pro" panose="02040504050005020304" pitchFamily="18" charset="0"/>
+              </a:rPr>
+              <a:t> &amp; Samuel, 2005), the 2022 Meliora Mentors, and the University of Rochester Brain &amp; Cognitive sciences department.</a:t>
             </a:r>
           </a:p>
         </p:txBody>
@@ -6524,8 +6489,8 @@
         </p:nvSpPr>
         <p:spPr>
           <a:xfrm>
-            <a:off x="1003312" y="12370678"/>
-            <a:ext cx="15039524" cy="1043665"/>
+            <a:off x="936495" y="13437763"/>
+            <a:ext cx="15228809" cy="752584"/>
           </a:xfrm>
           <a:prstGeom prst="roundRect">
             <a:avLst/>
@@ -6576,6 +6541,757 @@
               </a:solidFill>
               <a:latin typeface="Amasis MT Pro Medium" panose="02040604050005020304" pitchFamily="18" charset="0"/>
             </a:endParaRPr>
+          </a:p>
+        </p:txBody>
+      </p:sp>
+      <p:grpSp>
+        <p:nvGrpSpPr>
+          <p:cNvPr id="14" name="Group 13">
+            <a:extLst>
+              <a:ext uri="{FF2B5EF4-FFF2-40B4-BE49-F238E27FC236}">
+                <a16:creationId xmlns:a16="http://schemas.microsoft.com/office/drawing/2014/main" id="{BE370ECD-391D-3877-5282-4E15C22591E2}"/>
+              </a:ext>
+            </a:extLst>
+          </p:cNvPr>
+          <p:cNvGrpSpPr/>
+          <p:nvPr/>
+        </p:nvGrpSpPr>
+        <p:grpSpPr>
+          <a:xfrm>
+            <a:off x="37995834" y="24944113"/>
+            <a:ext cx="9537816" cy="1697745"/>
+            <a:chOff x="38655418" y="25256383"/>
+            <a:chExt cx="9537816" cy="1697745"/>
+          </a:xfrm>
+        </p:grpSpPr>
+        <p:sp>
+          <p:nvSpPr>
+            <p:cNvPr id="5" name="Rectangle: Rounded Corners 4">
+              <a:extLst>
+                <a:ext uri="{FF2B5EF4-FFF2-40B4-BE49-F238E27FC236}">
+                  <a16:creationId xmlns:a16="http://schemas.microsoft.com/office/drawing/2014/main" id="{79C752B2-D215-86EF-AF79-FCB75A603103}"/>
+                </a:ext>
+              </a:extLst>
+            </p:cNvPr>
+            <p:cNvSpPr/>
+            <p:nvPr/>
+          </p:nvSpPr>
+          <p:spPr>
+            <a:xfrm>
+              <a:off x="38785340" y="25863374"/>
+              <a:ext cx="9228654" cy="471093"/>
+            </a:xfrm>
+            <a:prstGeom prst="roundRect">
+              <a:avLst/>
+            </a:prstGeom>
+            <a:gradFill flip="none" rotWithShape="1">
+              <a:gsLst>
+                <a:gs pos="25000">
+                  <a:srgbClr val="FFF0D9"/>
+                </a:gs>
+                <a:gs pos="75000">
+                  <a:srgbClr val="FEF0EC"/>
+                </a:gs>
+                <a:gs pos="0">
+                  <a:srgbClr val="FFD89F"/>
+                </a:gs>
+                <a:gs pos="100000">
+                  <a:srgbClr val="FEDBD2"/>
+                </a:gs>
+              </a:gsLst>
+              <a:lin ang="0" scaled="1"/>
+              <a:tileRect/>
+            </a:gradFill>
+            <a:ln>
+              <a:solidFill>
+                <a:schemeClr val="bg2">
+                  <a:lumMod val="25000"/>
+                </a:schemeClr>
+              </a:solidFill>
+            </a:ln>
+          </p:spPr>
+          <p:style>
+            <a:lnRef idx="2">
+              <a:schemeClr val="accent1">
+                <a:shade val="50000"/>
+              </a:schemeClr>
+            </a:lnRef>
+            <a:fillRef idx="1">
+              <a:schemeClr val="accent1"/>
+            </a:fillRef>
+            <a:effectRef idx="0">
+              <a:schemeClr val="accent1"/>
+            </a:effectRef>
+            <a:fontRef idx="minor">
+              <a:schemeClr val="lt1"/>
+            </a:fontRef>
+          </p:style>
+          <p:txBody>
+            <a:bodyPr rtlCol="0" anchor="ctr"/>
+            <a:lstStyle/>
+            <a:p>
+              <a:pPr algn="ctr"/>
+              <a:endParaRPr lang="en-US" dirty="0"/>
+            </a:p>
+          </p:txBody>
+        </p:sp>
+        <p:grpSp>
+          <p:nvGrpSpPr>
+            <p:cNvPr id="9" name="Group 8">
+              <a:extLst>
+                <a:ext uri="{FF2B5EF4-FFF2-40B4-BE49-F238E27FC236}">
+                  <a16:creationId xmlns:a16="http://schemas.microsoft.com/office/drawing/2014/main" id="{BF7CDDA0-55D8-C5DE-E7B2-708FA212F867}"/>
+                </a:ext>
+              </a:extLst>
+            </p:cNvPr>
+            <p:cNvGrpSpPr/>
+            <p:nvPr/>
+          </p:nvGrpSpPr>
+          <p:grpSpPr>
+            <a:xfrm>
+              <a:off x="38689948" y="26273399"/>
+              <a:ext cx="9503286" cy="680729"/>
+              <a:chOff x="38689948" y="26201196"/>
+              <a:chExt cx="9503286" cy="680729"/>
+            </a:xfrm>
+          </p:grpSpPr>
+          <p:sp>
+            <p:nvSpPr>
+              <p:cNvPr id="6" name="TextBox 5">
+                <a:extLst>
+                  <a:ext uri="{FF2B5EF4-FFF2-40B4-BE49-F238E27FC236}">
+                    <a16:creationId xmlns:a16="http://schemas.microsoft.com/office/drawing/2014/main" id="{B988E8F1-10A7-0CEA-FE99-65FC9FBAB497}"/>
+                  </a:ext>
+                </a:extLst>
+              </p:cNvPr>
+              <p:cNvSpPr txBox="1"/>
+              <p:nvPr/>
+            </p:nvSpPr>
+            <p:spPr>
+              <a:xfrm>
+                <a:off x="47667454" y="26235594"/>
+                <a:ext cx="525780" cy="646331"/>
+              </a:xfrm>
+              <a:prstGeom prst="rect">
+                <a:avLst/>
+              </a:prstGeom>
+              <a:noFill/>
+            </p:spPr>
+            <p:txBody>
+              <a:bodyPr wrap="square" rtlCol="0">
+                <a:spAutoFit/>
+              </a:bodyPr>
+              <a:lstStyle/>
+              <a:p>
+                <a:r>
+                  <a:rPr lang="en-US" sz="3600" dirty="0">
+                    <a:latin typeface="Amasis MT Pro" panose="02040504050005020304" pitchFamily="18" charset="0"/>
+                  </a:rPr>
+                  <a:t>S</a:t>
+                </a:r>
+              </a:p>
+            </p:txBody>
+          </p:sp>
+          <p:sp>
+            <p:nvSpPr>
+              <p:cNvPr id="88" name="TextBox 87">
+                <a:extLst>
+                  <a:ext uri="{FF2B5EF4-FFF2-40B4-BE49-F238E27FC236}">
+                    <a16:creationId xmlns:a16="http://schemas.microsoft.com/office/drawing/2014/main" id="{39CC179F-3758-2AA5-9954-F4C4A2B37788}"/>
+                  </a:ext>
+                </a:extLst>
+              </p:cNvPr>
+              <p:cNvSpPr txBox="1"/>
+              <p:nvPr/>
+            </p:nvSpPr>
+            <p:spPr>
+              <a:xfrm>
+                <a:off x="38689948" y="26259934"/>
+                <a:ext cx="1005914" cy="584775"/>
+              </a:xfrm>
+              <a:prstGeom prst="rect">
+                <a:avLst/>
+              </a:prstGeom>
+              <a:noFill/>
+            </p:spPr>
+            <p:txBody>
+              <a:bodyPr wrap="square" rtlCol="0">
+                <a:spAutoFit/>
+              </a:bodyPr>
+              <a:lstStyle/>
+              <a:p>
+                <a:r>
+                  <a:rPr lang="en-US" sz="3200" dirty="0" err="1">
+                    <a:latin typeface="Amasis MT Pro" panose="02040504050005020304" pitchFamily="18" charset="0"/>
+                  </a:rPr>
+                  <a:t>Sh</a:t>
+                </a:r>
+                <a:endParaRPr lang="en-US" sz="3200" dirty="0">
+                  <a:latin typeface="Amasis MT Pro" panose="02040504050005020304" pitchFamily="18" charset="0"/>
+                </a:endParaRPr>
+              </a:p>
+            </p:txBody>
+          </p:sp>
+          <p:sp>
+            <p:nvSpPr>
+              <p:cNvPr id="92" name="TextBox 91">
+                <a:extLst>
+                  <a:ext uri="{FF2B5EF4-FFF2-40B4-BE49-F238E27FC236}">
+                    <a16:creationId xmlns:a16="http://schemas.microsoft.com/office/drawing/2014/main" id="{CA22584E-69A0-611F-8CE6-7E80D2A1135B}"/>
+                  </a:ext>
+                </a:extLst>
+              </p:cNvPr>
+              <p:cNvSpPr txBox="1"/>
+              <p:nvPr/>
+            </p:nvSpPr>
+            <p:spPr>
+              <a:xfrm>
+                <a:off x="41782969" y="26201196"/>
+                <a:ext cx="1005914" cy="584775"/>
+              </a:xfrm>
+              <a:prstGeom prst="rect">
+                <a:avLst/>
+              </a:prstGeom>
+              <a:noFill/>
+            </p:spPr>
+            <p:txBody>
+              <a:bodyPr wrap="square" rtlCol="0">
+                <a:spAutoFit/>
+              </a:bodyPr>
+              <a:lstStyle/>
+              <a:p>
+                <a:r>
+                  <a:rPr lang="en-US" sz="3200" dirty="0">
+                    <a:latin typeface="Amasis MT Pro" panose="02040504050005020304" pitchFamily="18" charset="0"/>
+                  </a:rPr>
+                  <a:t>?s</a:t>
+                </a:r>
+              </a:p>
+            </p:txBody>
+          </p:sp>
+          <p:sp>
+            <p:nvSpPr>
+              <p:cNvPr id="93" name="TextBox 92">
+                <a:extLst>
+                  <a:ext uri="{FF2B5EF4-FFF2-40B4-BE49-F238E27FC236}">
+                    <a16:creationId xmlns:a16="http://schemas.microsoft.com/office/drawing/2014/main" id="{B37CB430-7415-9608-B85D-7ED402AE3D63}"/>
+                  </a:ext>
+                </a:extLst>
+              </p:cNvPr>
+              <p:cNvSpPr txBox="1"/>
+              <p:nvPr/>
+            </p:nvSpPr>
+            <p:spPr>
+              <a:xfrm>
+                <a:off x="44968739" y="26235593"/>
+                <a:ext cx="955969" cy="646331"/>
+              </a:xfrm>
+              <a:prstGeom prst="rect">
+                <a:avLst/>
+              </a:prstGeom>
+              <a:noFill/>
+            </p:spPr>
+            <p:txBody>
+              <a:bodyPr wrap="square" rtlCol="0">
+                <a:spAutoFit/>
+              </a:bodyPr>
+              <a:lstStyle/>
+              <a:p>
+                <a:r>
+                  <a:rPr lang="en-US" sz="3600" dirty="0">
+                    <a:latin typeface="Amasis MT Pro" panose="02040504050005020304" pitchFamily="18" charset="0"/>
+                  </a:rPr>
+                  <a:t>?</a:t>
+                </a:r>
+                <a:r>
+                  <a:rPr lang="en-US" sz="3600" dirty="0" err="1">
+                    <a:latin typeface="Amasis MT Pro" panose="02040504050005020304" pitchFamily="18" charset="0"/>
+                  </a:rPr>
+                  <a:t>sh</a:t>
+                </a:r>
+                <a:endParaRPr lang="en-US" sz="3600" dirty="0">
+                  <a:latin typeface="Amasis MT Pro" panose="02040504050005020304" pitchFamily="18" charset="0"/>
+                </a:endParaRPr>
+              </a:p>
+            </p:txBody>
+          </p:sp>
+        </p:grpSp>
+        <p:sp>
+          <p:nvSpPr>
+            <p:cNvPr id="94" name="TextBox 93">
+              <a:extLst>
+                <a:ext uri="{FF2B5EF4-FFF2-40B4-BE49-F238E27FC236}">
+                  <a16:creationId xmlns:a16="http://schemas.microsoft.com/office/drawing/2014/main" id="{08C7485A-6105-9E31-0EC8-968E5F4BD8D4}"/>
+                </a:ext>
+              </a:extLst>
+            </p:cNvPr>
+            <p:cNvSpPr txBox="1"/>
+            <p:nvPr/>
+          </p:nvSpPr>
+          <p:spPr>
+            <a:xfrm>
+              <a:off x="38655418" y="25294400"/>
+              <a:ext cx="1388250" cy="646331"/>
+            </a:xfrm>
+            <a:prstGeom prst="rect">
+              <a:avLst/>
+            </a:prstGeom>
+            <a:noFill/>
+          </p:spPr>
+          <p:txBody>
+            <a:bodyPr wrap="square" rtlCol="0">
+              <a:spAutoFit/>
+            </a:bodyPr>
+            <a:lstStyle/>
+            <a:p>
+              <a:r>
+                <a:rPr lang="en-US" sz="3600" dirty="0">
+                  <a:latin typeface="Amasis MT Pro" panose="02040504050005020304" pitchFamily="18" charset="0"/>
+                </a:rPr>
+                <a:t>ashi</a:t>
+              </a:r>
+            </a:p>
+          </p:txBody>
+        </p:sp>
+        <p:sp>
+          <p:nvSpPr>
+            <p:cNvPr id="98" name="TextBox 97">
+              <a:extLst>
+                <a:ext uri="{FF2B5EF4-FFF2-40B4-BE49-F238E27FC236}">
+                  <a16:creationId xmlns:a16="http://schemas.microsoft.com/office/drawing/2014/main" id="{AFAF0C0C-DA35-8313-82DB-5955FDA8A7FF}"/>
+                </a:ext>
+              </a:extLst>
+            </p:cNvPr>
+            <p:cNvSpPr txBox="1"/>
+            <p:nvPr/>
+          </p:nvSpPr>
+          <p:spPr>
+            <a:xfrm>
+              <a:off x="47163858" y="25256383"/>
+              <a:ext cx="996028" cy="646331"/>
+            </a:xfrm>
+            <a:prstGeom prst="rect">
+              <a:avLst/>
+            </a:prstGeom>
+            <a:noFill/>
+          </p:spPr>
+          <p:txBody>
+            <a:bodyPr wrap="square" rtlCol="0">
+              <a:spAutoFit/>
+            </a:bodyPr>
+            <a:lstStyle/>
+            <a:p>
+              <a:pPr algn="r"/>
+              <a:r>
+                <a:rPr lang="en-US" sz="3600" dirty="0">
+                  <a:latin typeface="Amasis MT Pro" panose="02040504050005020304" pitchFamily="18" charset="0"/>
+                </a:rPr>
+                <a:t>asi</a:t>
+              </a:r>
+            </a:p>
+          </p:txBody>
+        </p:sp>
+        <p:cxnSp>
+          <p:nvCxnSpPr>
+            <p:cNvPr id="11" name="Straight Arrow Connector 10">
+              <a:extLst>
+                <a:ext uri="{FF2B5EF4-FFF2-40B4-BE49-F238E27FC236}">
+                  <a16:creationId xmlns:a16="http://schemas.microsoft.com/office/drawing/2014/main" id="{6BD348DC-2197-BDED-6A6C-9DEC37FC5518}"/>
+                </a:ext>
+              </a:extLst>
+            </p:cNvPr>
+            <p:cNvCxnSpPr>
+              <a:stCxn id="5" idx="1"/>
+              <a:endCxn id="5" idx="3"/>
+            </p:cNvCxnSpPr>
+            <p:nvPr/>
+          </p:nvCxnSpPr>
+          <p:spPr>
+            <a:xfrm>
+              <a:off x="38785340" y="26098921"/>
+              <a:ext cx="9228654" cy="0"/>
+            </a:xfrm>
+            <a:prstGeom prst="straightConnector1">
+              <a:avLst/>
+            </a:prstGeom>
+            <a:ln w="38100">
+              <a:solidFill>
+                <a:schemeClr val="bg2">
+                  <a:lumMod val="25000"/>
+                </a:schemeClr>
+              </a:solidFill>
+              <a:headEnd type="arrow" w="med" len="med"/>
+              <a:tailEnd type="arrow" w="med" len="med"/>
+            </a:ln>
+          </p:spPr>
+          <p:style>
+            <a:lnRef idx="1">
+              <a:schemeClr val="accent1"/>
+            </a:lnRef>
+            <a:fillRef idx="0">
+              <a:schemeClr val="accent1"/>
+            </a:fillRef>
+            <a:effectRef idx="0">
+              <a:schemeClr val="accent1"/>
+            </a:effectRef>
+            <a:fontRef idx="minor">
+              <a:schemeClr val="tx1"/>
+            </a:fontRef>
+          </p:style>
+        </p:cxnSp>
+      </p:grpSp>
+      <p:sp>
+        <p:nvSpPr>
+          <p:cNvPr id="89" name="TextBox 88">
+            <a:extLst>
+              <a:ext uri="{FF2B5EF4-FFF2-40B4-BE49-F238E27FC236}">
+                <a16:creationId xmlns:a16="http://schemas.microsoft.com/office/drawing/2014/main" id="{67622CCD-BBF2-3BFE-F128-F127915BD7E8}"/>
+              </a:ext>
+            </a:extLst>
+          </p:cNvPr>
+          <p:cNvSpPr txBox="1"/>
+          <p:nvPr/>
+        </p:nvSpPr>
+        <p:spPr>
+          <a:xfrm>
+            <a:off x="872708" y="25867167"/>
+            <a:ext cx="15252299" cy="1815882"/>
+          </a:xfrm>
+          <a:prstGeom prst="rect">
+            <a:avLst/>
+          </a:prstGeom>
+          <a:noFill/>
+        </p:spPr>
+        <p:txBody>
+          <a:bodyPr wrap="square" rtlCol="0">
+            <a:spAutoFit/>
+          </a:bodyPr>
+          <a:lstStyle/>
+          <a:p>
+            <a:pPr algn="ctr"/>
+            <a:r>
+              <a:rPr lang="en-US" sz="2800" i="1" dirty="0">
+                <a:latin typeface="Amasis MT Pro" panose="02040504050005020304" pitchFamily="18" charset="0"/>
+              </a:rPr>
+              <a:t>Figures 1A &amp; 1B: Graphical representations of listeners responses to the </a:t>
+            </a:r>
+            <a:r>
+              <a:rPr lang="en-US" sz="2800" i="1" dirty="0" err="1">
+                <a:latin typeface="Amasis MT Pro" panose="02040504050005020304" pitchFamily="18" charset="0"/>
+              </a:rPr>
+              <a:t>asi-ashi</a:t>
+            </a:r>
+            <a:r>
+              <a:rPr lang="en-US" sz="2800" i="1" dirty="0">
+                <a:latin typeface="Amasis MT Pro" panose="02040504050005020304" pitchFamily="18" charset="0"/>
+              </a:rPr>
+              <a:t> test continuum during the Test Phase. As the percent of energy of /s/ in the recording increases, the more likely participants are to respond “ashi” (/</a:t>
+            </a:r>
+            <a:r>
+              <a:rPr lang="en-US" sz="2800" dirty="0">
+                <a:solidFill>
+                  <a:schemeClr val="tx1">
+                    <a:lumMod val="85000"/>
+                    <a:lumOff val="15000"/>
+                  </a:schemeClr>
+                </a:solidFill>
+                <a:latin typeface="Amasis MT Pro" panose="02040504050005020304" pitchFamily="18" charset="0"/>
+              </a:rPr>
+              <a:t>ʃ</a:t>
+            </a:r>
+            <a:r>
+              <a:rPr lang="en-US" sz="2800" i="1" dirty="0">
+                <a:latin typeface="Amasis MT Pro" panose="02040504050005020304" pitchFamily="18" charset="0"/>
+              </a:rPr>
+              <a:t>/), rather than “asi”  (/s/). If perceptual adaptation is dependent on attentional resources, we anticipate the listener will adjustment to the unattended talker will be constrained.</a:t>
+            </a:r>
+          </a:p>
+        </p:txBody>
+      </p:sp>
+      <p:grpSp>
+        <p:nvGrpSpPr>
+          <p:cNvPr id="101" name="Group 100">
+            <a:extLst>
+              <a:ext uri="{FF2B5EF4-FFF2-40B4-BE49-F238E27FC236}">
+                <a16:creationId xmlns:a16="http://schemas.microsoft.com/office/drawing/2014/main" id="{9C464C11-7517-4B14-B676-B7691E129882}"/>
+              </a:ext>
+            </a:extLst>
+          </p:cNvPr>
+          <p:cNvGrpSpPr/>
+          <p:nvPr/>
+        </p:nvGrpSpPr>
+        <p:grpSpPr>
+          <a:xfrm>
+            <a:off x="2143463" y="14311832"/>
+            <a:ext cx="12683285" cy="11721185"/>
+            <a:chOff x="16167824" y="6166317"/>
+            <a:chExt cx="8419290" cy="8406534"/>
+          </a:xfrm>
+        </p:grpSpPr>
+        <p:pic>
+          <p:nvPicPr>
+            <p:cNvPr id="102" name="Picture 101">
+              <a:extLst>
+                <a:ext uri="{FF2B5EF4-FFF2-40B4-BE49-F238E27FC236}">
+                  <a16:creationId xmlns:a16="http://schemas.microsoft.com/office/drawing/2014/main" id="{9CC0F2C9-1BEF-3D35-9367-3435858A0CF6}"/>
+                </a:ext>
+              </a:extLst>
+            </p:cNvPr>
+            <p:cNvPicPr>
+              <a:picLocks noChangeAspect="1"/>
+            </p:cNvPicPr>
+            <p:nvPr/>
+          </p:nvPicPr>
+          <p:blipFill>
+            <a:blip r:embed="rId10"/>
+            <a:stretch>
+              <a:fillRect/>
+            </a:stretch>
+          </p:blipFill>
+          <p:spPr>
+            <a:xfrm>
+              <a:off x="16167824" y="6166317"/>
+              <a:ext cx="8382431" cy="4292821"/>
+            </a:xfrm>
+            <a:prstGeom prst="rect">
+              <a:avLst/>
+            </a:prstGeom>
+          </p:spPr>
+        </p:pic>
+        <p:pic>
+          <p:nvPicPr>
+            <p:cNvPr id="103" name="Picture 102">
+              <a:extLst>
+                <a:ext uri="{FF2B5EF4-FFF2-40B4-BE49-F238E27FC236}">
+                  <a16:creationId xmlns:a16="http://schemas.microsoft.com/office/drawing/2014/main" id="{7C2192A4-7007-7A47-9EE0-92107B07FB50}"/>
+                </a:ext>
+              </a:extLst>
+            </p:cNvPr>
+            <p:cNvPicPr>
+              <a:picLocks noChangeAspect="1"/>
+            </p:cNvPicPr>
+            <p:nvPr/>
+          </p:nvPicPr>
+          <p:blipFill>
+            <a:blip r:embed="rId11"/>
+            <a:stretch>
+              <a:fillRect/>
+            </a:stretch>
+          </p:blipFill>
+          <p:spPr>
+            <a:xfrm>
+              <a:off x="16179282" y="10222877"/>
+              <a:ext cx="8407832" cy="4349974"/>
+            </a:xfrm>
+            <a:prstGeom prst="rect">
+              <a:avLst/>
+            </a:prstGeom>
+          </p:spPr>
+        </p:pic>
+      </p:grpSp>
+      <p:sp>
+        <p:nvSpPr>
+          <p:cNvPr id="104" name="TextBox 103">
+            <a:extLst>
+              <a:ext uri="{FF2B5EF4-FFF2-40B4-BE49-F238E27FC236}">
+                <a16:creationId xmlns:a16="http://schemas.microsoft.com/office/drawing/2014/main" id="{64D7583C-AE5B-2931-BA9D-A355A00B4F03}"/>
+              </a:ext>
+            </a:extLst>
+          </p:cNvPr>
+          <p:cNvSpPr txBox="1"/>
+          <p:nvPr/>
+        </p:nvSpPr>
+        <p:spPr>
+          <a:xfrm>
+            <a:off x="17854734" y="21667241"/>
+            <a:ext cx="9548753" cy="954107"/>
+          </a:xfrm>
+          <a:prstGeom prst="rect">
+            <a:avLst/>
+          </a:prstGeom>
+          <a:noFill/>
+        </p:spPr>
+        <p:txBody>
+          <a:bodyPr wrap="square" rtlCol="0">
+            <a:spAutoFit/>
+          </a:bodyPr>
+          <a:lstStyle/>
+          <a:p>
+            <a:pPr algn="ctr"/>
+            <a:r>
+              <a:rPr lang="en-US" sz="2800" i="1" dirty="0">
+                <a:latin typeface="Amasis MT Pro" panose="02040504050005020304" pitchFamily="18" charset="0"/>
+              </a:rPr>
+              <a:t>Figure 2: Lists of s and </a:t>
+            </a:r>
+            <a:r>
+              <a:rPr lang="en-US" sz="2800" dirty="0">
+                <a:solidFill>
+                  <a:schemeClr val="tx1">
+                    <a:lumMod val="85000"/>
+                    <a:lumOff val="15000"/>
+                  </a:schemeClr>
+                </a:solidFill>
+                <a:latin typeface="Amasis MT Pro" panose="02040504050005020304" pitchFamily="18" charset="0"/>
+              </a:rPr>
+              <a:t>ʃ </a:t>
+            </a:r>
+            <a:r>
+              <a:rPr lang="en-US" sz="2800" i="1" dirty="0">
+                <a:solidFill>
+                  <a:schemeClr val="tx1">
+                    <a:lumMod val="85000"/>
+                    <a:lumOff val="15000"/>
+                  </a:schemeClr>
+                </a:solidFill>
+                <a:latin typeface="Amasis MT Pro" panose="02040504050005020304" pitchFamily="18" charset="0"/>
+              </a:rPr>
+              <a:t>words that will be produced in Talker A’s and Talker B’s voice, respectively</a:t>
+            </a:r>
+            <a:r>
+              <a:rPr lang="en-US" sz="2800" dirty="0">
+                <a:solidFill>
+                  <a:schemeClr val="tx1">
+                    <a:lumMod val="85000"/>
+                    <a:lumOff val="15000"/>
+                  </a:schemeClr>
+                </a:solidFill>
+                <a:latin typeface="Amasis MT Pro" panose="02040504050005020304" pitchFamily="18" charset="0"/>
+              </a:rPr>
+              <a:t>. </a:t>
+            </a:r>
+            <a:r>
+              <a:rPr lang="en-US" sz="2800" i="1" dirty="0">
+                <a:latin typeface="Amasis MT Pro" panose="02040504050005020304" pitchFamily="18" charset="0"/>
+              </a:rPr>
+              <a:t> </a:t>
+            </a:r>
+          </a:p>
+        </p:txBody>
+      </p:sp>
+      <p:sp>
+        <p:nvSpPr>
+          <p:cNvPr id="105" name="TextBox 104">
+            <a:extLst>
+              <a:ext uri="{FF2B5EF4-FFF2-40B4-BE49-F238E27FC236}">
+                <a16:creationId xmlns:a16="http://schemas.microsoft.com/office/drawing/2014/main" id="{95686F5A-A096-8B75-19AC-A31415EDCD28}"/>
+              </a:ext>
+            </a:extLst>
+          </p:cNvPr>
+          <p:cNvSpPr txBox="1"/>
+          <p:nvPr/>
+        </p:nvSpPr>
+        <p:spPr>
+          <a:xfrm>
+            <a:off x="41201530" y="22796232"/>
+            <a:ext cx="6814551" cy="1384995"/>
+          </a:xfrm>
+          <a:prstGeom prst="rect">
+            <a:avLst/>
+          </a:prstGeom>
+          <a:noFill/>
+        </p:spPr>
+        <p:txBody>
+          <a:bodyPr wrap="square" rtlCol="0">
+            <a:spAutoFit/>
+          </a:bodyPr>
+          <a:lstStyle/>
+          <a:p>
+            <a:pPr algn="ctr"/>
+            <a:r>
+              <a:rPr lang="en-US" sz="2800" i="1" dirty="0">
+                <a:latin typeface="Amasis MT Pro" panose="02040504050005020304" pitchFamily="18" charset="0"/>
+              </a:rPr>
+              <a:t>Figure 3: Visual illustrating how the words spoken by Talker A and Talker B will be paired to produce two sets of materials.</a:t>
+            </a:r>
+          </a:p>
+        </p:txBody>
+      </p:sp>
+      <p:sp>
+        <p:nvSpPr>
+          <p:cNvPr id="108" name="TextBox 107">
+            <a:extLst>
+              <a:ext uri="{FF2B5EF4-FFF2-40B4-BE49-F238E27FC236}">
+                <a16:creationId xmlns:a16="http://schemas.microsoft.com/office/drawing/2014/main" id="{E619A6A4-F642-1685-5F92-2414B35787B1}"/>
+              </a:ext>
+            </a:extLst>
+          </p:cNvPr>
+          <p:cNvSpPr txBox="1"/>
+          <p:nvPr/>
+        </p:nvSpPr>
+        <p:spPr>
+          <a:xfrm>
+            <a:off x="29266610" y="22960680"/>
+            <a:ext cx="11490223" cy="1384995"/>
+          </a:xfrm>
+          <a:prstGeom prst="rect">
+            <a:avLst/>
+          </a:prstGeom>
+          <a:noFill/>
+        </p:spPr>
+        <p:txBody>
+          <a:bodyPr wrap="square" rtlCol="0">
+            <a:spAutoFit/>
+          </a:bodyPr>
+          <a:lstStyle/>
+          <a:p>
+            <a:pPr algn="ctr"/>
+            <a:r>
+              <a:rPr lang="en-US" sz="2800" i="1" dirty="0">
+                <a:latin typeface="Amasis MT Pro" panose="02040504050005020304" pitchFamily="18" charset="0"/>
+              </a:rPr>
+              <a:t>Figure 4: Static representation of how a participant will progress through a trial. Each trial will begin with the participant hearing an audio file and then selecting either “Word” or “Nonword”.</a:t>
+            </a:r>
+          </a:p>
+        </p:txBody>
+      </p:sp>
+      <p:sp>
+        <p:nvSpPr>
+          <p:cNvPr id="109" name="TextBox 108">
+            <a:extLst>
+              <a:ext uri="{FF2B5EF4-FFF2-40B4-BE49-F238E27FC236}">
+                <a16:creationId xmlns:a16="http://schemas.microsoft.com/office/drawing/2014/main" id="{91BE0F46-68BA-5522-CC71-EC57DFCD6BE9}"/>
+              </a:ext>
+            </a:extLst>
+          </p:cNvPr>
+          <p:cNvSpPr txBox="1"/>
+          <p:nvPr/>
+        </p:nvSpPr>
+        <p:spPr>
+          <a:xfrm>
+            <a:off x="37521008" y="26538470"/>
+            <a:ext cx="10487469" cy="954107"/>
+          </a:xfrm>
+          <a:prstGeom prst="rect">
+            <a:avLst/>
+          </a:prstGeom>
+          <a:noFill/>
+        </p:spPr>
+        <p:txBody>
+          <a:bodyPr wrap="square" rtlCol="0">
+            <a:spAutoFit/>
+          </a:bodyPr>
+          <a:lstStyle/>
+          <a:p>
+            <a:pPr algn="ctr"/>
+            <a:r>
+              <a:rPr lang="en-US" sz="2800" i="1" dirty="0">
+                <a:latin typeface="Amasis MT Pro" panose="02040504050005020304" pitchFamily="18" charset="0"/>
+              </a:rPr>
+              <a:t>Figure 5h: “S” and “</a:t>
+            </a:r>
+            <a:r>
+              <a:rPr lang="en-US" sz="2800" i="1" dirty="0" err="1">
+                <a:latin typeface="Amasis MT Pro" panose="02040504050005020304" pitchFamily="18" charset="0"/>
+              </a:rPr>
+              <a:t>Sh</a:t>
+            </a:r>
+            <a:r>
+              <a:rPr lang="en-US" sz="2800" i="1" dirty="0">
+                <a:latin typeface="Amasis MT Pro" panose="02040504050005020304" pitchFamily="18" charset="0"/>
+              </a:rPr>
+              <a:t>” sounds exist on a spectrum, where “asi” can be altered to sound like “ashi” by changing the percentage of /s/ energy.  </a:t>
+            </a:r>
           </a:p>
         </p:txBody>
       </p:sp>

</xml_diff>

<commit_message>
Matt (rightfully) pointed out some grammar things :')
</commit_message>
<xml_diff>
--- a/Fellowship Conference 2022/Poster.pptx
+++ b/Fellowship Conference 2022/Poster.pptx
@@ -3661,7 +3661,25 @@
                 <a:ea typeface="Calibri" panose="020F0502020204030204" pitchFamily="34" charset="0"/>
                 <a:cs typeface="Times New Roman" panose="02020603050405020304" pitchFamily="18" charset="0"/>
               </a:rPr>
-              <a:t>alkers differ in how they produce speech sounds, even when they share similar language backgrounds. Still, listeners understand newly encountered talkers when hearing them speak for the first time. To overcome speech variation, the brain actively learns how talkers speak, and constructs expectations about how that talker will produce speech in the future. Though this process often occurs without the listener noticing,</a:t>
+              <a:t>alkers differ in how they produce speech sounds, even when they share similar language backgrounds. Still, listeners understand newly encountered talkers when hearing them speak for the first time. To overcome speech variation, the brain actively learns how talkers speak, </a:t>
+            </a:r>
+            <a:r>
+              <a:rPr lang="en-US" sz="3600">
+                <a:effectLst/>
+                <a:latin typeface="Amasis MT Pro" panose="02040504050005020304" pitchFamily="18" charset="0"/>
+                <a:ea typeface="Calibri" panose="020F0502020204030204" pitchFamily="34" charset="0"/>
+                <a:cs typeface="Times New Roman" panose="02020603050405020304" pitchFamily="18" charset="0"/>
+              </a:rPr>
+              <a:t>and construct </a:t>
+            </a:r>
+            <a:r>
+              <a:rPr lang="en-US" sz="3600" dirty="0">
+                <a:effectLst/>
+                <a:latin typeface="Amasis MT Pro" panose="02040504050005020304" pitchFamily="18" charset="0"/>
+                <a:ea typeface="Calibri" panose="020F0502020204030204" pitchFamily="34" charset="0"/>
+                <a:cs typeface="Times New Roman" panose="02020603050405020304" pitchFamily="18" charset="0"/>
+              </a:rPr>
+              <a:t>expectations about how that talker will produce speech in the future. Though this process often occurs without the listener noticing,</a:t>
             </a:r>
             <a:r>
               <a:rPr lang="en-US" sz="3600" dirty="0">

</xml_diff>

<commit_message>
Fixed a mistake in Test Phase (figure on right, not left).
</commit_message>
<xml_diff>
--- a/Fellowship Conference 2022/Poster.pptx
+++ b/Fellowship Conference 2022/Poster.pptx
@@ -3661,16 +3661,15 @@
                 <a:ea typeface="Calibri" panose="020F0502020204030204" pitchFamily="34" charset="0"/>
                 <a:cs typeface="Times New Roman" panose="02020603050405020304" pitchFamily="18" charset="0"/>
               </a:rPr>
-              <a:t>alkers differ in how they produce speech sounds, even when they share similar language backgrounds. Still, listeners understand newly encountered talkers when hearing them speak for the first time. To overcome speech variation, the brain actively learns how talkers speak, </a:t>
-            </a:r>
-            <a:r>
-              <a:rPr lang="en-US" sz="3600">
-                <a:effectLst/>
+              <a:t>alkers differ in how they produce speech sounds, even when they share similar language backgrounds. Still, listeners understand newly encountered talkers when hearing them speak for the first time. To overcome speech variation, the brain actively learns how talkers speak, and construct expectations about how that talker will produce speech in the future. Though this process often occurs without the listener noticing,</a:t>
+            </a:r>
+            <a:r>
+              <a:rPr lang="en-US" sz="3600" dirty="0">
                 <a:latin typeface="Amasis MT Pro" panose="02040504050005020304" pitchFamily="18" charset="0"/>
                 <a:ea typeface="Calibri" panose="020F0502020204030204" pitchFamily="34" charset="0"/>
                 <a:cs typeface="Times New Roman" panose="02020603050405020304" pitchFamily="18" charset="0"/>
               </a:rPr>
-              <a:t>and construct </a:t>
+              <a:t> how automatic speech perception adaptation is remains unclear. </a:t>
             </a:r>
             <a:r>
               <a:rPr lang="en-US" sz="3600" dirty="0">
@@ -3679,7 +3678,7 @@
                 <a:ea typeface="Calibri" panose="020F0502020204030204" pitchFamily="34" charset="0"/>
                 <a:cs typeface="Times New Roman" panose="02020603050405020304" pitchFamily="18" charset="0"/>
               </a:rPr>
-              <a:t>expectations about how that talker will produce speech in the future. Though this process often occurs without the listener noticing,</a:t>
+              <a:t>In this experiment, we </a:t>
             </a:r>
             <a:r>
               <a:rPr lang="en-US" sz="3600" dirty="0">
@@ -3687,7 +3686,7 @@
                 <a:ea typeface="Calibri" panose="020F0502020204030204" pitchFamily="34" charset="0"/>
                 <a:cs typeface="Times New Roman" panose="02020603050405020304" pitchFamily="18" charset="0"/>
               </a:rPr>
-              <a:t> how automatic speech perception adaptation is remains unclear. </a:t>
+              <a:t>will </a:t>
             </a:r>
             <a:r>
               <a:rPr lang="en-US" sz="3600" dirty="0">
@@ -3696,7 +3695,7 @@
                 <a:ea typeface="Calibri" panose="020F0502020204030204" pitchFamily="34" charset="0"/>
                 <a:cs typeface="Times New Roman" panose="02020603050405020304" pitchFamily="18" charset="0"/>
               </a:rPr>
-              <a:t>In this experiment, we will limit the available attentional resources for speech perception by exposing a listener to two talkers speaking simultaneously. We will then test the effects of directing the listener’s attention to one talker on the listener’s ability to adapt to both talkers.</a:t>
+              <a:t>limit the available attentional resources for speech perception by exposing a listener to two talkers speaking simultaneously. We will then test the effects of directing the listener’s attention to one talker on the listener’s ability to adapt to both talkers.</a:t>
             </a:r>
           </a:p>
         </p:txBody>
@@ -5964,7 +5963,7 @@
                 </a:solidFill>
                 <a:latin typeface="Amasis MT Pro" panose="02040504050005020304" pitchFamily="18" charset="0"/>
               </a:rPr>
-              <a:t>see left</a:t>
+              <a:t>see right</a:t>
             </a:r>
             <a:r>
               <a:rPr lang="en-US" sz="3600" dirty="0">

</xml_diff>

<commit_message>
Fixed the Cummings & Theodore paper citation
</commit_message>
<xml_diff>
--- a/Fellowship Conference 2022/Poster.pptx
+++ b/Fellowship Conference 2022/Poster.pptx
@@ -3855,7 +3855,7 @@
                 </a:solidFill>
                 <a:latin typeface="Amasis MT Pro" panose="02040504050005020304" pitchFamily="18" charset="0"/>
               </a:rPr>
-              <a:t>(Cummings &amp; Theodore, 2022</a:t>
+              <a:t>(Cummings &amp; Theodore, </a:t>
             </a:r>
             <a:r>
               <a:rPr lang="en-US" sz="3600" i="1" dirty="0">
@@ -3867,7 +3867,7 @@
                 </a:solidFill>
                 <a:latin typeface="Amasis MT Pro" panose="02040504050005020304" pitchFamily="18" charset="0"/>
               </a:rPr>
-              <a:t>).</a:t>
+              <a:t>accepted).</a:t>
             </a:r>
             <a:r>
               <a:rPr lang="en-US" sz="3600" dirty="0">
@@ -4078,7 +4078,33 @@
                 <a:latin typeface="Amasis MT Pro" panose="02040504050005020304" pitchFamily="18" charset="0"/>
                 <a:cs typeface="Angsana New" panose="02020603050405020304" pitchFamily="18" charset="-34"/>
               </a:rPr>
-              <a:t>Cummings, S. N. &amp; Theodore, R. M. (2022). Perceptual learning of multiple talkers: Detriments, characteristics, and limitations. </a:t>
+              <a:t>Cummings, S. N. &amp; Theodore, R. M. </a:t>
+            </a:r>
+            <a:r>
+              <a:rPr lang="en-US" sz="2700" i="1" dirty="0">
+                <a:solidFill>
+                  <a:schemeClr val="tx1">
+                    <a:lumMod val="85000"/>
+                    <a:lumOff val="15000"/>
+                  </a:schemeClr>
+                </a:solidFill>
+                <a:latin typeface="Amasis MT Pro" panose="02040504050005020304" pitchFamily="18" charset="0"/>
+                <a:cs typeface="Angsana New" panose="02020603050405020304" pitchFamily="18" charset="-34"/>
+              </a:rPr>
+              <a:t>(accepted). </a:t>
+            </a:r>
+            <a:r>
+              <a:rPr lang="en-US" sz="2700" dirty="0">
+                <a:solidFill>
+                  <a:schemeClr val="tx1">
+                    <a:lumMod val="85000"/>
+                    <a:lumOff val="15000"/>
+                  </a:schemeClr>
+                </a:solidFill>
+                <a:latin typeface="Amasis MT Pro" panose="02040504050005020304" pitchFamily="18" charset="0"/>
+                <a:cs typeface="Angsana New" panose="02020603050405020304" pitchFamily="18" charset="-34"/>
+              </a:rPr>
+              <a:t>Perceptual learning of multiple talkers: Detriments, characteristics, and limitations. </a:t>
             </a:r>
             <a:r>
               <a:rPr lang="en-US" sz="2700" i="1" dirty="0">

</xml_diff>

<commit_message>
Extensive (imo) of writing in Poster and Abstract
</commit_message>
<xml_diff>
--- a/Fellowship Conference 2022/Poster.pptx
+++ b/Fellowship Conference 2022/Poster.pptx
@@ -260,7 +260,7 @@
           <a:p>
             <a:fld id="{215A6F6B-4740-4ABA-990A-DB123C3F0656}" type="datetimeFigureOut">
               <a:rPr lang="en-US" smtClean="0"/>
-              <a:t>7/28/2022</a:t>
+              <a:t>7/29/2022</a:t>
             </a:fld>
             <a:endParaRPr lang="en-US"/>
           </a:p>
@@ -430,7 +430,7 @@
           <a:p>
             <a:fld id="{215A6F6B-4740-4ABA-990A-DB123C3F0656}" type="datetimeFigureOut">
               <a:rPr lang="en-US" smtClean="0"/>
-              <a:t>7/28/2022</a:t>
+              <a:t>7/29/2022</a:t>
             </a:fld>
             <a:endParaRPr lang="en-US"/>
           </a:p>
@@ -610,7 +610,7 @@
           <a:p>
             <a:fld id="{215A6F6B-4740-4ABA-990A-DB123C3F0656}" type="datetimeFigureOut">
               <a:rPr lang="en-US" smtClean="0"/>
-              <a:t>7/28/2022</a:t>
+              <a:t>7/29/2022</a:t>
             </a:fld>
             <a:endParaRPr lang="en-US"/>
           </a:p>
@@ -780,7 +780,7 @@
           <a:p>
             <a:fld id="{215A6F6B-4740-4ABA-990A-DB123C3F0656}" type="datetimeFigureOut">
               <a:rPr lang="en-US" smtClean="0"/>
-              <a:t>7/28/2022</a:t>
+              <a:t>7/29/2022</a:t>
             </a:fld>
             <a:endParaRPr lang="en-US"/>
           </a:p>
@@ -1024,7 +1024,7 @@
           <a:p>
             <a:fld id="{215A6F6B-4740-4ABA-990A-DB123C3F0656}" type="datetimeFigureOut">
               <a:rPr lang="en-US" smtClean="0"/>
-              <a:t>7/28/2022</a:t>
+              <a:t>7/29/2022</a:t>
             </a:fld>
             <a:endParaRPr lang="en-US"/>
           </a:p>
@@ -1256,7 +1256,7 @@
           <a:p>
             <a:fld id="{215A6F6B-4740-4ABA-990A-DB123C3F0656}" type="datetimeFigureOut">
               <a:rPr lang="en-US" smtClean="0"/>
-              <a:t>7/28/2022</a:t>
+              <a:t>7/29/2022</a:t>
             </a:fld>
             <a:endParaRPr lang="en-US"/>
           </a:p>
@@ -1623,7 +1623,7 @@
           <a:p>
             <a:fld id="{215A6F6B-4740-4ABA-990A-DB123C3F0656}" type="datetimeFigureOut">
               <a:rPr lang="en-US" smtClean="0"/>
-              <a:t>7/28/2022</a:t>
+              <a:t>7/29/2022</a:t>
             </a:fld>
             <a:endParaRPr lang="en-US"/>
           </a:p>
@@ -1741,7 +1741,7 @@
           <a:p>
             <a:fld id="{215A6F6B-4740-4ABA-990A-DB123C3F0656}" type="datetimeFigureOut">
               <a:rPr lang="en-US" smtClean="0"/>
-              <a:t>7/28/2022</a:t>
+              <a:t>7/29/2022</a:t>
             </a:fld>
             <a:endParaRPr lang="en-US"/>
           </a:p>
@@ -1836,7 +1836,7 @@
           <a:p>
             <a:fld id="{215A6F6B-4740-4ABA-990A-DB123C3F0656}" type="datetimeFigureOut">
               <a:rPr lang="en-US" smtClean="0"/>
-              <a:t>7/28/2022</a:t>
+              <a:t>7/29/2022</a:t>
             </a:fld>
             <a:endParaRPr lang="en-US"/>
           </a:p>
@@ -2113,7 +2113,7 @@
           <a:p>
             <a:fld id="{215A6F6B-4740-4ABA-990A-DB123C3F0656}" type="datetimeFigureOut">
               <a:rPr lang="en-US" smtClean="0"/>
-              <a:t>7/28/2022</a:t>
+              <a:t>7/29/2022</a:t>
             </a:fld>
             <a:endParaRPr lang="en-US"/>
           </a:p>
@@ -2370,7 +2370,7 @@
           <a:p>
             <a:fld id="{215A6F6B-4740-4ABA-990A-DB123C3F0656}" type="datetimeFigureOut">
               <a:rPr lang="en-US" smtClean="0"/>
-              <a:t>7/28/2022</a:t>
+              <a:t>7/29/2022</a:t>
             </a:fld>
             <a:endParaRPr lang="en-US"/>
           </a:p>
@@ -2583,7 +2583,7 @@
           <a:p>
             <a:fld id="{215A6F6B-4740-4ABA-990A-DB123C3F0656}" type="datetimeFigureOut">
               <a:rPr lang="en-US" smtClean="0"/>
-              <a:t>7/28/2022</a:t>
+              <a:t>7/29/2022</a:t>
             </a:fld>
             <a:endParaRPr lang="en-US"/>
           </a:p>
@@ -3002,7 +3002,7 @@
         </p:nvSpPr>
         <p:spPr>
           <a:xfrm>
-            <a:off x="827833" y="8934026"/>
+            <a:off x="689680" y="10284139"/>
             <a:ext cx="15297174" cy="882695"/>
           </a:xfrm>
           <a:prstGeom prst="roundRect">
@@ -3242,7 +3242,7 @@
         </p:nvSpPr>
         <p:spPr>
           <a:xfrm>
-            <a:off x="830122" y="1010462"/>
+            <a:off x="832710" y="614395"/>
             <a:ext cx="15335183" cy="729596"/>
           </a:xfrm>
           <a:prstGeom prst="roundRect">
@@ -3450,7 +3450,7 @@
         </p:nvGrpSpPr>
         <p:grpSpPr>
           <a:xfrm>
-            <a:off x="827900" y="8625298"/>
+            <a:off x="689747" y="9975411"/>
             <a:ext cx="15333038" cy="4413792"/>
             <a:chOff x="936163" y="12563362"/>
             <a:chExt cx="15249277" cy="4536707"/>
@@ -3621,8 +3621,8 @@
         </p:nvSpPr>
         <p:spPr>
           <a:xfrm>
-            <a:off x="830122" y="1807204"/>
-            <a:ext cx="15335184" cy="6575198"/>
+            <a:off x="832710" y="1431053"/>
+            <a:ext cx="15335184" cy="8353569"/>
           </a:xfrm>
           <a:prstGeom prst="rect">
             <a:avLst/>
@@ -3652,7 +3652,23 @@
                 <a:ea typeface="Calibri" panose="020F0502020204030204" pitchFamily="34" charset="0"/>
                 <a:cs typeface="Times New Roman" panose="02020603050405020304" pitchFamily="18" charset="0"/>
               </a:rPr>
-              <a:t>Spoken language is highly variable by nature. T</a:t>
+              <a:t>Despite spoken language being highly variable, listeners can often </a:t>
+            </a:r>
+            <a:r>
+              <a:rPr lang="en-US" sz="3600">
+                <a:latin typeface="Amasis MT Pro" panose="02040504050005020304" pitchFamily="18" charset="0"/>
+                <a:ea typeface="Calibri" panose="020F0502020204030204" pitchFamily="34" charset="0"/>
+                <a:cs typeface="Times New Roman" panose="02020603050405020304" pitchFamily="18" charset="0"/>
+              </a:rPr>
+              <a:t>understand newly encountered </a:t>
+            </a:r>
+            <a:r>
+              <a:rPr lang="en-US" sz="3600" dirty="0">
+                <a:latin typeface="Amasis MT Pro" panose="02040504050005020304" pitchFamily="18" charset="0"/>
+                <a:ea typeface="Calibri" panose="020F0502020204030204" pitchFamily="34" charset="0"/>
+                <a:cs typeface="Times New Roman" panose="02020603050405020304" pitchFamily="18" charset="0"/>
+              </a:rPr>
+              <a:t>talkers when hearing them speak for the very first time.</a:t>
             </a:r>
             <a:r>
               <a:rPr lang="en-US" sz="3600" dirty="0">
@@ -3661,7 +3677,7 @@
                 <a:ea typeface="Calibri" panose="020F0502020204030204" pitchFamily="34" charset="0"/>
                 <a:cs typeface="Times New Roman" panose="02020603050405020304" pitchFamily="18" charset="0"/>
               </a:rPr>
-              <a:t>alkers differ in how they produce speech sounds, even when they share similar language backgrounds. Still, listeners understand newly encountered talkers when hearing them speak for the first time. To overcome speech variation, the brain actively learns how talkers speak, and construct expectations about how that talker will produce speech in the future. Though this process often occurs without the listener noticing,</a:t>
+              <a:t> </a:t>
             </a:r>
             <a:r>
               <a:rPr lang="en-US" sz="3600" dirty="0">
@@ -3669,7 +3685,7 @@
                 <a:ea typeface="Calibri" panose="020F0502020204030204" pitchFamily="34" charset="0"/>
                 <a:cs typeface="Times New Roman" panose="02020603050405020304" pitchFamily="18" charset="0"/>
               </a:rPr>
-              <a:t> how automatic speech perception adaptation is remains unclear. </a:t>
+              <a:t>Variation in speech presents a unique challenge for cognitive processing that is solved seemingly automatically: Our</a:t>
             </a:r>
             <a:r>
               <a:rPr lang="en-US" sz="3600" dirty="0">
@@ -3678,15 +3694,19 @@
                 <a:ea typeface="Calibri" panose="020F0502020204030204" pitchFamily="34" charset="0"/>
                 <a:cs typeface="Times New Roman" panose="02020603050405020304" pitchFamily="18" charset="0"/>
               </a:rPr>
-              <a:t>In this experiment, we </a:t>
-            </a:r>
-            <a:r>
-              <a:rPr lang="en-US" sz="3600" dirty="0">
+              <a:t> brains learn how talkers speak, and then apply this information to construct expectations about speech they encounter in the future. This process often occurs without the listener even noticing. However, this phenomenon presents the question of </a:t>
+            </a:r>
+            <a:r>
+              <a:rPr lang="en-US" sz="3600" b="1" dirty="0">
+                <a:solidFill>
+                  <a:srgbClr val="4D7000"/>
+                </a:solidFill>
+                <a:effectLst/>
                 <a:latin typeface="Amasis MT Pro" panose="02040504050005020304" pitchFamily="18" charset="0"/>
                 <a:ea typeface="Calibri" panose="020F0502020204030204" pitchFamily="34" charset="0"/>
                 <a:cs typeface="Times New Roman" panose="02020603050405020304" pitchFamily="18" charset="0"/>
               </a:rPr>
-              <a:t>will </a:t>
+              <a:t>how automatic is speech perception adaptation?</a:t>
             </a:r>
             <a:r>
               <a:rPr lang="en-US" sz="3600" dirty="0">
@@ -3695,7 +3715,86 @@
                 <a:ea typeface="Calibri" panose="020F0502020204030204" pitchFamily="34" charset="0"/>
                 <a:cs typeface="Times New Roman" panose="02020603050405020304" pitchFamily="18" charset="0"/>
               </a:rPr>
-              <a:t>limit the available attentional resources for speech perception by exposing a listener to two talkers speaking simultaneously. We will then test the effects of directing the listener’s attention to one talker on the listener’s ability to adapt to both talkers.</a:t>
+              <a:t> Are </a:t>
+            </a:r>
+            <a:r>
+              <a:rPr lang="en-US" sz="3600" dirty="0">
+                <a:latin typeface="Amasis MT Pro" panose="02040504050005020304" pitchFamily="18" charset="0"/>
+                <a:ea typeface="Calibri" panose="020F0502020204030204" pitchFamily="34" charset="0"/>
+                <a:cs typeface="Times New Roman" panose="02020603050405020304" pitchFamily="18" charset="0"/>
+              </a:rPr>
+              <a:t>we constantly processing any speech we happen to hear in our environment? In this study, we will explore the automaticity of speech perception and adaptation when participants’ </a:t>
+            </a:r>
+            <a:r>
+              <a:rPr lang="en-US" sz="3600" dirty="0">
+                <a:effectLst/>
+                <a:latin typeface="Amasis MT Pro" panose="02040504050005020304" pitchFamily="18" charset="0"/>
+                <a:ea typeface="Calibri" panose="020F0502020204030204" pitchFamily="34" charset="0"/>
+                <a:cs typeface="Times New Roman" panose="02020603050405020304" pitchFamily="18" charset="0"/>
+              </a:rPr>
+              <a:t>available attentional resources are limited. To achieve this, we will expose listeners to two talkers speaking simultaneously</a:t>
+            </a:r>
+            <a:r>
+              <a:rPr lang="en-US" sz="3600" dirty="0">
+                <a:latin typeface="Amasis MT Pro" panose="02040504050005020304" pitchFamily="18" charset="0"/>
+                <a:ea typeface="Calibri" panose="020F0502020204030204" pitchFamily="34" charset="0"/>
+                <a:cs typeface="Times New Roman" panose="02020603050405020304" pitchFamily="18" charset="0"/>
+              </a:rPr>
+              <a:t>, and test </a:t>
+            </a:r>
+            <a:r>
+              <a:rPr lang="en-US" sz="3600" dirty="0">
+                <a:effectLst/>
+                <a:latin typeface="Amasis MT Pro" panose="02040504050005020304" pitchFamily="18" charset="0"/>
+                <a:ea typeface="Calibri" panose="020F0502020204030204" pitchFamily="34" charset="0"/>
+                <a:cs typeface="Times New Roman" panose="02020603050405020304" pitchFamily="18" charset="0"/>
+              </a:rPr>
+              <a:t>the effects of </a:t>
+            </a:r>
+            <a:r>
+              <a:rPr lang="en-US" sz="3600" b="1" i="1" dirty="0">
+                <a:solidFill>
+                  <a:srgbClr val="4D7000"/>
+                </a:solidFill>
+                <a:effectLst/>
+                <a:latin typeface="Amasis MT Pro" panose="02040504050005020304" pitchFamily="18" charset="0"/>
+                <a:ea typeface="Calibri" panose="020F0502020204030204" pitchFamily="34" charset="0"/>
+                <a:cs typeface="Times New Roman" panose="02020603050405020304" pitchFamily="18" charset="0"/>
+              </a:rPr>
+              <a:t>directing the listener’s attention to one talker</a:t>
+            </a:r>
+            <a:r>
+              <a:rPr lang="en-US" sz="3600" i="1" dirty="0">
+                <a:solidFill>
+                  <a:srgbClr val="4D7000"/>
+                </a:solidFill>
+                <a:effectLst/>
+                <a:latin typeface="Amasis MT Pro" panose="02040504050005020304" pitchFamily="18" charset="0"/>
+                <a:ea typeface="Calibri" panose="020F0502020204030204" pitchFamily="34" charset="0"/>
+                <a:cs typeface="Times New Roman" panose="02020603050405020304" pitchFamily="18" charset="0"/>
+              </a:rPr>
+              <a:t> </a:t>
+            </a:r>
+            <a:r>
+              <a:rPr lang="en-US" sz="3600" dirty="0">
+                <a:effectLst/>
+                <a:latin typeface="Amasis MT Pro" panose="02040504050005020304" pitchFamily="18" charset="0"/>
+                <a:ea typeface="Calibri" panose="020F0502020204030204" pitchFamily="34" charset="0"/>
+                <a:cs typeface="Times New Roman" panose="02020603050405020304" pitchFamily="18" charset="0"/>
+              </a:rPr>
+              <a:t>on the listener’s </a:t>
+            </a:r>
+            <a:r>
+              <a:rPr lang="en-US" sz="3600" b="1" i="1" dirty="0">
+                <a:solidFill>
+                  <a:srgbClr val="4D7000"/>
+                </a:solidFill>
+                <a:effectLst/>
+                <a:latin typeface="Amasis MT Pro" panose="02040504050005020304" pitchFamily="18" charset="0"/>
+                <a:ea typeface="Calibri" panose="020F0502020204030204" pitchFamily="34" charset="0"/>
+                <a:cs typeface="Times New Roman" panose="02020603050405020304" pitchFamily="18" charset="0"/>
+              </a:rPr>
+              <a:t>ability to adapt to both talkers.</a:t>
             </a:r>
           </a:p>
         </p:txBody>
@@ -3714,7 +3813,7 @@
         </p:nvSpPr>
         <p:spPr>
           <a:xfrm>
-            <a:off x="17302495" y="5831172"/>
+            <a:off x="17302495" y="5639340"/>
             <a:ext cx="30756775" cy="2308324"/>
           </a:xfrm>
           <a:prstGeom prst="rect">
@@ -3763,7 +3862,7 @@
                 </a:solidFill>
                 <a:latin typeface="Amasis MT Pro" panose="02040504050005020304" pitchFamily="18" charset="0"/>
               </a:rPr>
-              <a:t>/ as in “Shock.” Earlier research suggests that listener adaptation to talker S-ʃ production is </a:t>
+              <a:t>/ as in “Shock.” Earlier research suggests that listeners’ adaptation to S-ʃ production is </a:t>
             </a:r>
             <a:r>
               <a:rPr lang="en-US" sz="3600" b="1" dirty="0">
@@ -3784,7 +3883,7 @@
                 </a:solidFill>
                 <a:latin typeface="Amasis MT Pro" panose="02040504050005020304" pitchFamily="18" charset="0"/>
               </a:rPr>
-              <a:t>. </a:t>
+              <a:t>,</a:t>
             </a:r>
             <a:r>
               <a:rPr lang="en-US" sz="3600" dirty="0">
@@ -3796,7 +3895,7 @@
                 </a:solidFill>
                 <a:latin typeface="Amasis MT Pro" panose="02040504050005020304" pitchFamily="18" charset="0"/>
               </a:rPr>
-              <a:t>This means that listeners adjust their perceived boundary between S-ʃ for each talker regardless of other talkers the listener may also hear (</a:t>
+              <a:t> meaning that listeners adjust their perceived boundary between S-ʃ for each talker (</a:t>
             </a:r>
             <a:r>
               <a:rPr lang="en-US" sz="3600" dirty="0" err="1">
@@ -3834,7 +3933,7 @@
                 </a:solidFill>
                 <a:latin typeface="Amasis MT Pro" panose="02040504050005020304" pitchFamily="18" charset="0"/>
               </a:rPr>
-              <a:t>). </a:t>
+              <a:t>).  In contrast, listener’s judgement of other sound categories can be influenced by and applied to multiple talkers. </a:t>
             </a:r>
             <a:r>
               <a:rPr lang="en-US" sz="3600" b="1" dirty="0">
@@ -3843,7 +3942,28 @@
                 </a:solidFill>
                 <a:latin typeface="Amasis MT Pro" panose="02040504050005020304" pitchFamily="18" charset="0"/>
               </a:rPr>
-              <a:t>This quality could allow us to simulate two distinct talkers with different S-ʃ productions during the same experimental exposure </a:t>
+              <a:t>This quality</a:t>
+            </a:r>
+            <a:r>
+              <a:rPr lang="en-US" sz="3600" dirty="0">
+                <a:solidFill>
+                  <a:schemeClr val="tx1">
+                    <a:lumMod val="85000"/>
+                    <a:lumOff val="15000"/>
+                  </a:schemeClr>
+                </a:solidFill>
+                <a:latin typeface="Amasis MT Pro" panose="02040504050005020304" pitchFamily="18" charset="0"/>
+              </a:rPr>
+              <a:t> </a:t>
+            </a:r>
+            <a:r>
+              <a:rPr lang="en-US" sz="3600" b="1" dirty="0">
+                <a:solidFill>
+                  <a:srgbClr val="4D7000"/>
+                </a:solidFill>
+                <a:latin typeface="Amasis MT Pro" panose="02040504050005020304" pitchFamily="18" charset="0"/>
+              </a:rPr>
+              <a:t>of how the S-ʃ is perceived could allow us to simulate two distinct talkers with different S-ʃ productions during the same experimental exposure </a:t>
             </a:r>
             <a:r>
               <a:rPr lang="en-US" sz="3600" dirty="0">
@@ -4350,7 +4470,7 @@
         </p:nvSpPr>
         <p:spPr>
           <a:xfrm>
-            <a:off x="16979046" y="9788427"/>
+            <a:off x="17182484" y="9666246"/>
             <a:ext cx="11718810" cy="1754326"/>
           </a:xfrm>
           <a:prstGeom prst="rect">
@@ -4495,7 +4615,7 @@
         </p:nvSpPr>
         <p:spPr>
           <a:xfrm>
-            <a:off x="16979046" y="11717703"/>
+            <a:off x="17182484" y="11595522"/>
             <a:ext cx="11718810" cy="1754326"/>
           </a:xfrm>
           <a:prstGeom prst="rect">
@@ -4640,7 +4760,7 @@
         </p:nvGrpSpPr>
         <p:grpSpPr>
           <a:xfrm>
-            <a:off x="28987930" y="17952611"/>
+            <a:off x="29191368" y="17830430"/>
             <a:ext cx="12218585" cy="830997"/>
             <a:chOff x="21061830" y="5544601"/>
             <a:chExt cx="10481936" cy="830997"/>
@@ -4741,7 +4861,7 @@
         </p:nvSpPr>
         <p:spPr>
           <a:xfrm>
-            <a:off x="29147404" y="18663371"/>
+            <a:off x="29350842" y="18541190"/>
             <a:ext cx="12054127" cy="2862322"/>
           </a:xfrm>
           <a:prstGeom prst="rect">
@@ -4765,7 +4885,7 @@
                 </a:solidFill>
                 <a:latin typeface="Amasis MT Pro" panose="02040504050005020304" pitchFamily="18" charset="0"/>
               </a:rPr>
-              <a:t>Participants will be instructed to attend to either the female talker or the male talker. They will then perform a series of 2-option forced-choice lexical decision tasks, in which they hear a recording and then select on their screen if this talker said a word or a nonword (</a:t>
+              <a:t>Participants will be instructed to attend to either the female talker or the male talker. They will then perform a series of 2-option forced-choice lexical decision tasks, in which they will hear a recording and then select if this talker said a word or a nonword (</a:t>
             </a:r>
             <a:r>
               <a:rPr lang="en-US" sz="3600" i="1" dirty="0">
@@ -4813,7 +4933,7 @@
         </p:blipFill>
         <p:spPr>
           <a:xfrm>
-            <a:off x="41452435" y="11559804"/>
+            <a:off x="41452435" y="11857289"/>
             <a:ext cx="6572167" cy="11593595"/>
           </a:xfrm>
           <a:prstGeom prst="rect">
@@ -4835,7 +4955,7 @@
         </p:nvSpPr>
         <p:spPr>
           <a:xfrm>
-            <a:off x="28987930" y="14703943"/>
+            <a:off x="29171161" y="14274926"/>
             <a:ext cx="4771955" cy="830997"/>
           </a:xfrm>
           <a:prstGeom prst="rect">
@@ -4874,7 +4994,7 @@
         </p:nvCxnSpPr>
         <p:spPr>
           <a:xfrm>
-            <a:off x="32596197" y="15119441"/>
+            <a:off x="32779428" y="14690424"/>
             <a:ext cx="8610317" cy="0"/>
           </a:xfrm>
           <a:prstGeom prst="line">
@@ -4915,7 +5035,7 @@
         </p:nvSpPr>
         <p:spPr>
           <a:xfrm>
-            <a:off x="872708" y="27816791"/>
+            <a:off x="872708" y="28203363"/>
             <a:ext cx="15335182" cy="752583"/>
           </a:xfrm>
           <a:prstGeom prst="roundRect">
@@ -4984,7 +5104,7 @@
         </p:nvSpPr>
         <p:spPr>
           <a:xfrm>
-            <a:off x="29147403" y="11669871"/>
+            <a:off x="29346071" y="11425735"/>
             <a:ext cx="12621864" cy="2862322"/>
           </a:xfrm>
           <a:prstGeom prst="rect">
@@ -5017,7 +5137,7 @@
               <a:rPr lang="en-US" sz="3600" dirty="0">
                 <a:latin typeface="Amasis MT Pro" panose="02040504050005020304" pitchFamily="18" charset="0"/>
               </a:rPr>
-              <a:t>where one talker is played in the left ear, and the other in the right ear. Like talker gender, ear assignment was counterbalanced across participants.</a:t>
+              <a:t>where one talker is played in the left ear, and the other in the right ear. Like talker gender and which materials are accented, ear assignment will be counterbalanced across participants.</a:t>
             </a:r>
           </a:p>
         </p:txBody>
@@ -5044,7 +5164,7 @@
         </p:blipFill>
         <p:spPr>
           <a:xfrm>
-            <a:off x="22556548" y="15421391"/>
+            <a:off x="22759986" y="15299210"/>
             <a:ext cx="5101113" cy="6483959"/>
           </a:xfrm>
           <a:prstGeom prst="rect">
@@ -5074,7 +5194,7 @@
         </p:blipFill>
         <p:spPr>
           <a:xfrm>
-            <a:off x="17488770" y="15573227"/>
+            <a:off x="17692208" y="15451046"/>
             <a:ext cx="5101113" cy="6268062"/>
           </a:xfrm>
           <a:prstGeom prst="rect">
@@ -5096,7 +5216,7 @@
         </p:nvSpPr>
         <p:spPr>
           <a:xfrm>
-            <a:off x="16957632" y="13643951"/>
+            <a:off x="17161070" y="13521770"/>
             <a:ext cx="11718810" cy="1754326"/>
           </a:xfrm>
           <a:prstGeom prst="rect">
@@ -5182,7 +5302,7 @@
         </p:nvSpPr>
         <p:spPr>
           <a:xfrm>
-            <a:off x="16902377" y="22750109"/>
+            <a:off x="17105815" y="22627928"/>
             <a:ext cx="11490223" cy="1754326"/>
           </a:xfrm>
           <a:prstGeom prst="rect">
@@ -5268,7 +5388,7 @@
         </p:nvSpPr>
         <p:spPr>
           <a:xfrm>
-            <a:off x="29147403" y="9283674"/>
+            <a:off x="29350841" y="9038698"/>
             <a:ext cx="19051815" cy="2308324"/>
           </a:xfrm>
           <a:prstGeom prst="rect">
@@ -5346,7 +5466,7 @@
         </p:nvCxnSpPr>
         <p:spPr>
           <a:xfrm flipV="1">
-            <a:off x="28778372" y="9440615"/>
+            <a:off x="28981810" y="9318434"/>
             <a:ext cx="43541" cy="15136055"/>
           </a:xfrm>
           <a:prstGeom prst="line">
@@ -5387,8 +5507,8 @@
         </p:nvSpPr>
         <p:spPr>
           <a:xfrm>
-            <a:off x="29117769" y="15470854"/>
-            <a:ext cx="12204772" cy="2308324"/>
+            <a:off x="29367200" y="14950156"/>
+            <a:ext cx="12204772" cy="2862322"/>
           </a:xfrm>
           <a:prstGeom prst="rect">
             <a:avLst/>
@@ -5474,7 +5594,7 @@
                 </a:solidFill>
                 <a:latin typeface="Amasis MT Pro" panose="02040504050005020304" pitchFamily="18" charset="0"/>
               </a:rPr>
-              <a:t>trials. During filler trials, one talker will say a word and the other talker will say a nonword. Each talker has a 50% chance of saying a nonword.</a:t>
+              <a:t>trials. During filler trials, one talker will say a word and the other talker will say a nonword. The attended talker will have a 50% chance of saying a nonword.</a:t>
             </a:r>
           </a:p>
         </p:txBody>
@@ -5493,8 +5613,8 @@
         </p:nvSpPr>
         <p:spPr>
           <a:xfrm>
-            <a:off x="855212" y="28569374"/>
-            <a:ext cx="15133276" cy="3600986"/>
+            <a:off x="855212" y="28955946"/>
+            <a:ext cx="15133276" cy="3016210"/>
           </a:xfrm>
           <a:prstGeom prst="rect">
             <a:avLst/>
@@ -5517,7 +5637,7 @@
                 </a:solidFill>
                 <a:latin typeface="Amasis MT Pro" panose="02040504050005020304" pitchFamily="18" charset="0"/>
               </a:rPr>
-              <a:t>The results of this experiment begin to explore the role of attention in speech perception adaptation. A listener’s perceptual boundary changing more to fit the attended talker’s speech than the unattended talker’s speech would suggest there are limits to the automaticity of speech perception and may also provide insight into how our brains allocate attentional resources under higher cognitive loads.</a:t>
+              <a:t>A listener’s perceptual boundary changing more to fit the attended talker’s speech than the unattended talker’s speech would suggest there are limits to the automaticity of speech perception, while conversely complete adaptation to both talkers would suggest that humans automatically adapt their perception to any speech in their environment.</a:t>
             </a:r>
           </a:p>
         </p:txBody>
@@ -5538,7 +5658,7 @@
         </p:nvCxnSpPr>
         <p:spPr>
           <a:xfrm>
-            <a:off x="21062212" y="9346393"/>
+            <a:off x="21265650" y="9224212"/>
             <a:ext cx="6902466" cy="0"/>
           </a:xfrm>
           <a:prstGeom prst="line">
@@ -5579,7 +5699,7 @@
         </p:nvSpPr>
         <p:spPr>
           <a:xfrm>
-            <a:off x="16981986" y="8930438"/>
+            <a:off x="17185424" y="8808257"/>
             <a:ext cx="4600813" cy="830997"/>
           </a:xfrm>
           <a:prstGeom prst="rect">
@@ -5616,7 +5736,7 @@
         </p:nvGrpSpPr>
         <p:grpSpPr>
           <a:xfrm>
-            <a:off x="16895618" y="8300430"/>
+            <a:off x="17099056" y="8178249"/>
             <a:ext cx="31163652" cy="830997"/>
             <a:chOff x="16707188" y="8070830"/>
             <a:chExt cx="31391596" cy="830997"/>
@@ -5760,7 +5880,7 @@
         </p:nvGrpSpPr>
         <p:grpSpPr>
           <a:xfrm>
-            <a:off x="16895618" y="24371853"/>
+            <a:off x="17143675" y="24292866"/>
             <a:ext cx="31119033" cy="830997"/>
             <a:chOff x="16869211" y="8092025"/>
             <a:chExt cx="31119033" cy="830997"/>
@@ -5905,7 +6025,7 @@
         </p:nvSpPr>
         <p:spPr>
           <a:xfrm>
-            <a:off x="16895618" y="25230341"/>
+            <a:off x="17070824" y="25147504"/>
             <a:ext cx="20497573" cy="2308324"/>
           </a:xfrm>
           <a:prstGeom prst="rect">
@@ -6020,10 +6140,10 @@
         </p:nvGrpSpPr>
         <p:grpSpPr>
           <a:xfrm>
-            <a:off x="29841703" y="21547886"/>
-            <a:ext cx="10165564" cy="1342061"/>
-            <a:chOff x="29966567" y="22271676"/>
-            <a:chExt cx="10805596" cy="1448145"/>
+            <a:off x="29893074" y="21541823"/>
+            <a:ext cx="10165564" cy="1348045"/>
+            <a:chOff x="29966567" y="22265219"/>
+            <a:chExt cx="10805596" cy="1454602"/>
           </a:xfrm>
         </p:grpSpPr>
         <p:pic>
@@ -6182,7 +6302,7 @@
           </p:nvSpPr>
           <p:spPr>
             <a:xfrm>
-              <a:off x="30136122" y="22292756"/>
+              <a:off x="30130551" y="22265219"/>
               <a:ext cx="1832584" cy="584775"/>
             </a:xfrm>
             <a:prstGeom prst="rect">
@@ -6197,7 +6317,7 @@
             <a:lstStyle/>
             <a:p>
               <a:r>
-                <a:rPr lang="en-US" sz="2800" dirty="0">
+                <a:rPr lang="en-US" sz="2800" b="1" i="1" dirty="0">
                   <a:solidFill>
                     <a:schemeClr val="tx1">
                       <a:lumMod val="85000"/>
@@ -6240,7 +6360,7 @@
             <a:lstStyle/>
             <a:p>
               <a:r>
-                <a:rPr lang="en-US" sz="2800" dirty="0">
+                <a:rPr lang="en-US" sz="2800" b="1" i="1" dirty="0">
                   <a:solidFill>
                     <a:schemeClr val="tx1">
                       <a:lumMod val="85000"/>
@@ -6532,7 +6652,7 @@
         </p:nvSpPr>
         <p:spPr>
           <a:xfrm>
-            <a:off x="936495" y="13437763"/>
+            <a:off x="834487" y="14835406"/>
             <a:ext cx="15228809" cy="752584"/>
           </a:xfrm>
           <a:prstGeom prst="roundRect">
@@ -6601,10 +6721,10 @@
         </p:nvGrpSpPr>
         <p:grpSpPr>
           <a:xfrm>
-            <a:off x="37995834" y="24944113"/>
-            <a:ext cx="9537816" cy="1697745"/>
-            <a:chOff x="38655418" y="25256383"/>
-            <a:chExt cx="9537816" cy="1697745"/>
+            <a:off x="38014402" y="24860391"/>
+            <a:ext cx="9801774" cy="1698630"/>
+            <a:chOff x="38498780" y="25255498"/>
+            <a:chExt cx="9801774" cy="1698630"/>
           </a:xfrm>
         </p:grpSpPr>
         <p:sp>
@@ -6873,7 +6993,7 @@
           </p:nvSpPr>
           <p:spPr>
             <a:xfrm>
-              <a:off x="38655418" y="25294400"/>
+              <a:off x="38498780" y="25293651"/>
               <a:ext cx="1388250" cy="646331"/>
             </a:xfrm>
             <a:prstGeom prst="rect">
@@ -6910,7 +7030,7 @@
           </p:nvSpPr>
           <p:spPr>
             <a:xfrm>
-              <a:off x="47163858" y="25256383"/>
+              <a:off x="47304526" y="25255498"/>
               <a:ext cx="996028" cy="646331"/>
             </a:xfrm>
             <a:prstGeom prst="rect">
@@ -6997,7 +7117,7 @@
         </p:nvSpPr>
         <p:spPr>
           <a:xfrm>
-            <a:off x="872708" y="25867167"/>
+            <a:off x="872708" y="26245634"/>
             <a:ext cx="15252299" cy="1815882"/>
           </a:xfrm>
           <a:prstGeom prst="rect">
@@ -7028,7 +7148,7 @@
               <a:rPr lang="en-US" sz="2800" i="1" dirty="0">
                 <a:latin typeface="Amasis MT Pro" panose="02040504050005020304" pitchFamily="18" charset="0"/>
               </a:rPr>
-              <a:t> test continuum during the Test Phase. As the percent of energy of /s/ in the recording increases, the more likely participants are to respond “ashi” (/</a:t>
+              <a:t> test continuum during the Test Phase. As the percent of /s/ energy in the stimulus increases, the more likely participants are to respond “ashi” (/</a:t>
             </a:r>
             <a:r>
               <a:rPr lang="en-US" sz="2800" dirty="0">
@@ -7065,7 +7185,7 @@
         </p:nvSpPr>
         <p:spPr>
           <a:xfrm>
-            <a:off x="17854734" y="21667241"/>
+            <a:off x="18058172" y="21545060"/>
             <a:ext cx="9548753" cy="954107"/>
           </a:xfrm>
           <a:prstGeom prst="rect">
@@ -7084,7 +7204,7 @@
               <a:rPr lang="en-US" sz="2800" i="1" dirty="0">
                 <a:latin typeface="Amasis MT Pro" panose="02040504050005020304" pitchFamily="18" charset="0"/>
               </a:rPr>
-              <a:t>Figure 2: Lists of s and </a:t>
+              <a:t>Figure 2: The lists of s and </a:t>
             </a:r>
             <a:r>
               <a:rPr lang="en-US" sz="2800" dirty="0">
@@ -7108,26 +7228,11 @@
                 </a:solidFill>
                 <a:latin typeface="Amasis MT Pro" panose="02040504050005020304" pitchFamily="18" charset="0"/>
               </a:rPr>
-              <a:t>words that will be produced in Talker A’s and Talker B’s voice, respectively</a:t>
-            </a:r>
-            <a:r>
-              <a:rPr lang="en-US" sz="2800" dirty="0">
-                <a:solidFill>
-                  <a:schemeClr val="tx1">
-                    <a:lumMod val="85000"/>
-                    <a:lumOff val="15000"/>
-                  </a:schemeClr>
-                </a:solidFill>
-                <a:latin typeface="Amasis MT Pro" panose="02040504050005020304" pitchFamily="18" charset="0"/>
-              </a:rPr>
-              <a:t>. </a:t>
-            </a:r>
-            <a:r>
-              <a:rPr lang="en-US" sz="2800" i="1" dirty="0">
-                <a:latin typeface="Amasis MT Pro" panose="02040504050005020304" pitchFamily="18" charset="0"/>
-              </a:rPr>
-              <a:t> </a:t>
-            </a:r>
+              <a:t>words that will be produced in Talker A’s voice (left) and Talker B’s voice (right).</a:t>
+            </a:r>
+            <a:endParaRPr lang="en-US" sz="2800" i="1" dirty="0">
+              <a:latin typeface="Amasis MT Pro" panose="02040504050005020304" pitchFamily="18" charset="0"/>
+            </a:endParaRPr>
           </a:p>
         </p:txBody>
       </p:sp>
@@ -7145,7 +7250,7 @@
         </p:nvSpPr>
         <p:spPr>
           <a:xfrm>
-            <a:off x="41201530" y="22796232"/>
+            <a:off x="41404968" y="23099129"/>
             <a:ext cx="6814551" cy="1384995"/>
           </a:xfrm>
           <a:prstGeom prst="rect">
@@ -7164,7 +7269,7 @@
               <a:rPr lang="en-US" sz="2800" i="1" dirty="0">
                 <a:latin typeface="Amasis MT Pro" panose="02040504050005020304" pitchFamily="18" charset="0"/>
               </a:rPr>
-              <a:t>Figure 3: Visual illustrating how the words spoken by Talker A and Talker B will be paired to produce two sets of materials.</a:t>
+              <a:t>Figure 3: A visual illustrating how the words spoken by Talker A and Talker B will be paired to produce two sets of materials.</a:t>
             </a:r>
           </a:p>
         </p:txBody>
@@ -7183,7 +7288,7 @@
         </p:nvSpPr>
         <p:spPr>
           <a:xfrm>
-            <a:off x="29266610" y="22960680"/>
+            <a:off x="29470048" y="22838499"/>
             <a:ext cx="11490223" cy="1384995"/>
           </a:xfrm>
           <a:prstGeom prst="rect">
@@ -7202,7 +7307,7 @@
               <a:rPr lang="en-US" sz="2800" i="1" dirty="0">
                 <a:latin typeface="Amasis MT Pro" panose="02040504050005020304" pitchFamily="18" charset="0"/>
               </a:rPr>
-              <a:t>Figure 4: Static representation of how a participant will progress through a trial. Each trial will begin with the participant hearing an audio file and then selecting either “Word” or “Nonword”.</a:t>
+              <a:t>Figure 4: A static representation of how a participant will progress through a trial. Each trial will begin with the participant hearing an audio file and then selecting either “Word” or “Nonword”.</a:t>
             </a:r>
           </a:p>
         </p:txBody>
@@ -7221,7 +7326,7 @@
         </p:nvSpPr>
         <p:spPr>
           <a:xfrm>
-            <a:off x="37521008" y="26538470"/>
+            <a:off x="37711749" y="26602087"/>
             <a:ext cx="10487469" cy="954107"/>
           </a:xfrm>
           <a:prstGeom prst="rect">
@@ -7240,7 +7345,7 @@
               <a:rPr lang="en-US" sz="2800" i="1" dirty="0">
                 <a:latin typeface="Amasis MT Pro" panose="02040504050005020304" pitchFamily="18" charset="0"/>
               </a:rPr>
-              <a:t>Figure 5h: “S” and “</a:t>
+              <a:t>Figure 5: “S” and “</a:t>
             </a:r>
             <a:r>
               <a:rPr lang="en-US" sz="2800" i="1" dirty="0" err="1">
@@ -7271,8 +7376,8 @@
         </p:nvGrpSpPr>
         <p:grpSpPr>
           <a:xfrm>
-            <a:off x="2227968" y="14324089"/>
-            <a:ext cx="12526314" cy="11558948"/>
+            <a:off x="2634849" y="15808330"/>
+            <a:ext cx="11716895" cy="10437304"/>
             <a:chOff x="1558990" y="14352071"/>
             <a:chExt cx="11253002" cy="10681507"/>
           </a:xfrm>

</xml_diff>